<commit_message>
added notification and foreground service
</commit_message>
<xml_diff>
--- a/slides/Services_Settings.pptx
+++ b/slides/Services_Settings.pptx
@@ -20,6 +20,8 @@
     <p:sldId id="263" r:id="rId14"/>
     <p:sldId id="271" r:id="rId15"/>
     <p:sldId id="264" r:id="rId16"/>
+    <p:sldId id="272" r:id="rId17"/>
+    <p:sldId id="273" r:id="rId18"/>
   </p:sldIdLst>
   <p:sldSz cx="12192000" cy="6858000"/>
   <p:notesSz cx="6858000" cy="9144000"/>
@@ -120,7 +122,7 @@
   </p:defaultTextStyle>
   <p:extLst>
     <p:ext uri="{EFAFB233-063F-42B5-8137-9DF3F51BA10A}">
-      <p15:sldGuideLst xmlns:p15="http://schemas.microsoft.com/office/powerpoint/2012/main">
+      <p15:sldGuideLst xmlns:p15="http://schemas.microsoft.com/office/powerpoint/2012/main" xmlns="">
         <p15:guide id="1" orient="horz" pos="2160">
           <p15:clr>
             <a:srgbClr val="A4A3A4"/>
@@ -324,7 +326,7 @@
           <a:p>
             <a:fld id="{1E7C2FAA-919F-4BF2-9DC6-6D7D1753D0B1}" type="datetimeFigureOut">
               <a:rPr lang="en-US" smtClean="0"/>
-              <a:t>6/25/2017</a:t>
+              <a:t>6/26/2017</a:t>
             </a:fld>
             <a:endParaRPr lang="en-US"/>
           </a:p>
@@ -492,7 +494,7 @@
           <a:p>
             <a:fld id="{1E7C2FAA-919F-4BF2-9DC6-6D7D1753D0B1}" type="datetimeFigureOut">
               <a:rPr lang="en-US" smtClean="0"/>
-              <a:t>6/25/2017</a:t>
+              <a:t>6/26/2017</a:t>
             </a:fld>
             <a:endParaRPr lang="en-US"/>
           </a:p>
@@ -670,7 +672,7 @@
           <a:p>
             <a:fld id="{1E7C2FAA-919F-4BF2-9DC6-6D7D1753D0B1}" type="datetimeFigureOut">
               <a:rPr lang="en-US" smtClean="0"/>
-              <a:t>6/25/2017</a:t>
+              <a:t>6/26/2017</a:t>
             </a:fld>
             <a:endParaRPr lang="en-US"/>
           </a:p>
@@ -853,7 +855,7 @@
           <a:p>
             <a:fld id="{1E7C2FAA-919F-4BF2-9DC6-6D7D1753D0B1}" type="datetimeFigureOut">
               <a:rPr lang="en-US" smtClean="0"/>
-              <a:t>6/25/2017</a:t>
+              <a:t>6/26/2017</a:t>
             </a:fld>
             <a:endParaRPr lang="en-US"/>
           </a:p>
@@ -1098,7 +1100,7 @@
           <a:p>
             <a:fld id="{1E7C2FAA-919F-4BF2-9DC6-6D7D1753D0B1}" type="datetimeFigureOut">
               <a:rPr lang="en-US" smtClean="0"/>
-              <a:t>6/25/2017</a:t>
+              <a:t>6/26/2017</a:t>
             </a:fld>
             <a:endParaRPr lang="en-US"/>
           </a:p>
@@ -1392,7 +1394,7 @@
           <a:p>
             <a:fld id="{1E7C2FAA-919F-4BF2-9DC6-6D7D1753D0B1}" type="datetimeFigureOut">
               <a:rPr lang="en-US" smtClean="0"/>
-              <a:t>6/25/2017</a:t>
+              <a:t>6/26/2017</a:t>
             </a:fld>
             <a:endParaRPr lang="en-US"/>
           </a:p>
@@ -1816,7 +1818,7 @@
           <a:p>
             <a:fld id="{1E7C2FAA-919F-4BF2-9DC6-6D7D1753D0B1}" type="datetimeFigureOut">
               <a:rPr lang="en-US" smtClean="0"/>
-              <a:t>6/25/2017</a:t>
+              <a:t>6/26/2017</a:t>
             </a:fld>
             <a:endParaRPr lang="en-US"/>
           </a:p>
@@ -1933,7 +1935,7 @@
           <a:p>
             <a:fld id="{1E7C2FAA-919F-4BF2-9DC6-6D7D1753D0B1}" type="datetimeFigureOut">
               <a:rPr lang="en-US" smtClean="0"/>
-              <a:t>6/25/2017</a:t>
+              <a:t>6/26/2017</a:t>
             </a:fld>
             <a:endParaRPr lang="en-US"/>
           </a:p>
@@ -2028,7 +2030,7 @@
           <a:p>
             <a:fld id="{1E7C2FAA-919F-4BF2-9DC6-6D7D1753D0B1}" type="datetimeFigureOut">
               <a:rPr lang="en-US" smtClean="0"/>
-              <a:t>6/25/2017</a:t>
+              <a:t>6/26/2017</a:t>
             </a:fld>
             <a:endParaRPr lang="en-US"/>
           </a:p>
@@ -2306,7 +2308,7 @@
           <a:p>
             <a:fld id="{1E7C2FAA-919F-4BF2-9DC6-6D7D1753D0B1}" type="datetimeFigureOut">
               <a:rPr lang="en-US" smtClean="0"/>
-              <a:t>6/25/2017</a:t>
+              <a:t>6/26/2017</a:t>
             </a:fld>
             <a:endParaRPr lang="en-US"/>
           </a:p>
@@ -2564,7 +2566,7 @@
           <a:p>
             <a:fld id="{1E7C2FAA-919F-4BF2-9DC6-6D7D1753D0B1}" type="datetimeFigureOut">
               <a:rPr lang="en-US" smtClean="0"/>
-              <a:t>6/25/2017</a:t>
+              <a:t>6/26/2017</a:t>
             </a:fld>
             <a:endParaRPr lang="en-US"/>
           </a:p>
@@ -2821,7 +2823,7 @@
           <a:p>
             <a:fld id="{1E7C2FAA-919F-4BF2-9DC6-6D7D1753D0B1}" type="datetimeFigureOut">
               <a:rPr lang="en-US" smtClean="0"/>
-              <a:t>6/25/2017</a:t>
+              <a:t>6/26/2017</a:t>
             </a:fld>
             <a:endParaRPr lang="en-US"/>
           </a:p>
@@ -3250,6 +3252,13 @@
   <p:clrMapOvr>
     <a:masterClrMapping/>
   </p:clrMapOvr>
+  <p:timing>
+    <p:tnLst>
+      <p:par>
+        <p:cTn id="1" dur="indefinite" restart="never" nodeType="tmRoot"/>
+      </p:par>
+    </p:tnLst>
+  </p:timing>
 </p:sld>
 </file>
 
@@ -3275,7 +3284,7 @@
           <p:cNvPr id="2" name="Title 1">
             <a:extLst>
               <a:ext uri="{FF2B5EF4-FFF2-40B4-BE49-F238E27FC236}">
-                <a16:creationId xmlns:a16="http://schemas.microsoft.com/office/drawing/2014/main" id="{6937279D-980D-4DF7-A4CF-5D668463941A}"/>
+                <a16:creationId xmlns:a16="http://schemas.microsoft.com/office/drawing/2014/main" xmlns="" id="{6937279D-980D-4DF7-A4CF-5D668463941A}"/>
               </a:ext>
             </a:extLst>
           </p:cNvPr>
@@ -3303,7 +3312,7 @@
           <p:cNvPr id="4" name="Content Placeholder 3">
             <a:extLst>
               <a:ext uri="{FF2B5EF4-FFF2-40B4-BE49-F238E27FC236}">
-                <a16:creationId xmlns:a16="http://schemas.microsoft.com/office/drawing/2014/main" id="{6BFCAA9E-8A0D-4756-B208-F45FC9974D2F}"/>
+                <a16:creationId xmlns:a16="http://schemas.microsoft.com/office/drawing/2014/main" xmlns="" id="{6BFCAA9E-8A0D-4756-B208-F45FC9974D2F}"/>
               </a:ext>
             </a:extLst>
           </p:cNvPr>
@@ -3335,7 +3344,7 @@
           <p:cNvPr id="5" name="TextBox 4">
             <a:extLst>
               <a:ext uri="{FF2B5EF4-FFF2-40B4-BE49-F238E27FC236}">
-                <a16:creationId xmlns:a16="http://schemas.microsoft.com/office/drawing/2014/main" id="{36F7D2E2-470E-41D1-BA97-76C0BA03DDF7}"/>
+                <a16:creationId xmlns:a16="http://schemas.microsoft.com/office/drawing/2014/main" xmlns="" id="{36F7D2E2-470E-41D1-BA97-76C0BA03DDF7}"/>
               </a:ext>
             </a:extLst>
           </p:cNvPr>
@@ -3396,7 +3405,7 @@
           <p:cNvPr id="6" name="TextBox 5">
             <a:extLst>
               <a:ext uri="{FF2B5EF4-FFF2-40B4-BE49-F238E27FC236}">
-                <a16:creationId xmlns:a16="http://schemas.microsoft.com/office/drawing/2014/main" id="{766545FC-D4DE-4578-96E6-87A47314220B}"/>
+                <a16:creationId xmlns:a16="http://schemas.microsoft.com/office/drawing/2014/main" xmlns="" id="{766545FC-D4DE-4578-96E6-87A47314220B}"/>
               </a:ext>
             </a:extLst>
           </p:cNvPr>
@@ -3457,7 +3466,7 @@
           <p:cNvPr id="7" name="TextBox 6">
             <a:extLst>
               <a:ext uri="{FF2B5EF4-FFF2-40B4-BE49-F238E27FC236}">
-                <a16:creationId xmlns:a16="http://schemas.microsoft.com/office/drawing/2014/main" id="{1DE4ACB1-692E-418D-B5CD-B8666F49138D}"/>
+                <a16:creationId xmlns:a16="http://schemas.microsoft.com/office/drawing/2014/main" xmlns="" id="{1DE4ACB1-692E-418D-B5CD-B8666F49138D}"/>
               </a:ext>
             </a:extLst>
           </p:cNvPr>
@@ -3505,6 +3514,13 @@
   <p:clrMapOvr>
     <a:masterClrMapping/>
   </p:clrMapOvr>
+  <p:timing>
+    <p:tnLst>
+      <p:par>
+        <p:cTn id="1" dur="indefinite" restart="never" nodeType="tmRoot"/>
+      </p:par>
+    </p:tnLst>
+  </p:timing>
 </p:sld>
 </file>
 
@@ -3530,7 +3546,7 @@
           <p:cNvPr id="2" name="Title 1">
             <a:extLst>
               <a:ext uri="{FF2B5EF4-FFF2-40B4-BE49-F238E27FC236}">
-                <a16:creationId xmlns:a16="http://schemas.microsoft.com/office/drawing/2014/main" id="{C6B3C4AA-0696-42B7-BFBA-88BF681676F3}"/>
+                <a16:creationId xmlns:a16="http://schemas.microsoft.com/office/drawing/2014/main" xmlns="" id="{C6B3C4AA-0696-42B7-BFBA-88BF681676F3}"/>
               </a:ext>
             </a:extLst>
           </p:cNvPr>
@@ -3566,7 +3582,7 @@
           <p:cNvPr id="3" name="Content Placeholder 2">
             <a:extLst>
               <a:ext uri="{FF2B5EF4-FFF2-40B4-BE49-F238E27FC236}">
-                <a16:creationId xmlns:a16="http://schemas.microsoft.com/office/drawing/2014/main" id="{778757EE-D58B-47E0-9CC6-D83D05B46709}"/>
+                <a16:creationId xmlns:a16="http://schemas.microsoft.com/office/drawing/2014/main" xmlns="" id="{778757EE-D58B-47E0-9CC6-D83D05B46709}"/>
               </a:ext>
             </a:extLst>
           </p:cNvPr>
@@ -3599,6 +3615,13 @@
   <p:clrMapOvr>
     <a:masterClrMapping/>
   </p:clrMapOvr>
+  <p:timing>
+    <p:tnLst>
+      <p:par>
+        <p:cTn id="1" dur="indefinite" restart="never" nodeType="tmRoot"/>
+      </p:par>
+    </p:tnLst>
+  </p:timing>
 </p:sld>
 </file>
 
@@ -3624,7 +3647,7 @@
           <p:cNvPr id="2" name="Title 1">
             <a:extLst>
               <a:ext uri="{FF2B5EF4-FFF2-40B4-BE49-F238E27FC236}">
-                <a16:creationId xmlns:a16="http://schemas.microsoft.com/office/drawing/2014/main" id="{9859EDE4-7BA9-4843-B5A2-2D8038774186}"/>
+                <a16:creationId xmlns:a16="http://schemas.microsoft.com/office/drawing/2014/main" xmlns="" id="{9859EDE4-7BA9-4843-B5A2-2D8038774186}"/>
               </a:ext>
             </a:extLst>
           </p:cNvPr>
@@ -3657,7 +3680,7 @@
           <p:cNvPr id="3" name="Content Placeholder 2">
             <a:extLst>
               <a:ext uri="{FF2B5EF4-FFF2-40B4-BE49-F238E27FC236}">
-                <a16:creationId xmlns:a16="http://schemas.microsoft.com/office/drawing/2014/main" id="{3B25B7D2-3AB5-4338-8D2E-F7E8238F1199}"/>
+                <a16:creationId xmlns:a16="http://schemas.microsoft.com/office/drawing/2014/main" xmlns="" id="{3B25B7D2-3AB5-4338-8D2E-F7E8238F1199}"/>
               </a:ext>
             </a:extLst>
           </p:cNvPr>
@@ -3824,6 +3847,13 @@
   <p:clrMapOvr>
     <a:masterClrMapping/>
   </p:clrMapOvr>
+  <p:timing>
+    <p:tnLst>
+      <p:par>
+        <p:cTn id="1" dur="indefinite" restart="never" nodeType="tmRoot"/>
+      </p:par>
+    </p:tnLst>
+  </p:timing>
 </p:sld>
 </file>
 
@@ -3849,7 +3879,7 @@
           <p:cNvPr id="2" name="Title 1">
             <a:extLst>
               <a:ext uri="{FF2B5EF4-FFF2-40B4-BE49-F238E27FC236}">
-                <a16:creationId xmlns:a16="http://schemas.microsoft.com/office/drawing/2014/main" id="{48A4C6BC-8CF2-4ED9-AAD5-B66E8A6EC3CB}"/>
+                <a16:creationId xmlns:a16="http://schemas.microsoft.com/office/drawing/2014/main" xmlns="" id="{48A4C6BC-8CF2-4ED9-AAD5-B66E8A6EC3CB}"/>
               </a:ext>
             </a:extLst>
           </p:cNvPr>
@@ -3877,7 +3907,7 @@
           <p:cNvPr id="3" name="Content Placeholder 2">
             <a:extLst>
               <a:ext uri="{FF2B5EF4-FFF2-40B4-BE49-F238E27FC236}">
-                <a16:creationId xmlns:a16="http://schemas.microsoft.com/office/drawing/2014/main" id="{32F5BCC4-DA59-4E39-8604-419C79E47299}"/>
+                <a16:creationId xmlns:a16="http://schemas.microsoft.com/office/drawing/2014/main" xmlns="" id="{32F5BCC4-DA59-4E39-8604-419C79E47299}"/>
               </a:ext>
             </a:extLst>
           </p:cNvPr>
@@ -4641,7 +4671,7 @@
           <p:cNvPr id="4" name="Arrow: Left 3">
             <a:extLst>
               <a:ext uri="{FF2B5EF4-FFF2-40B4-BE49-F238E27FC236}">
-                <a16:creationId xmlns:a16="http://schemas.microsoft.com/office/drawing/2014/main" id="{3C9BD402-F6F2-4A1F-8930-55022137CFE9}"/>
+                <a16:creationId xmlns:a16="http://schemas.microsoft.com/office/drawing/2014/main" xmlns="" id="{3C9BD402-F6F2-4A1F-8930-55022137CFE9}"/>
               </a:ext>
             </a:extLst>
           </p:cNvPr>
@@ -4849,7 +4879,7 @@
           <p:cNvPr id="2" name="Title 1">
             <a:extLst>
               <a:ext uri="{FF2B5EF4-FFF2-40B4-BE49-F238E27FC236}">
-                <a16:creationId xmlns:a16="http://schemas.microsoft.com/office/drawing/2014/main" id="{C1EB33D9-A64D-43EF-AE74-8A48B19FA639}"/>
+                <a16:creationId xmlns:a16="http://schemas.microsoft.com/office/drawing/2014/main" xmlns="" id="{C1EB33D9-A64D-43EF-AE74-8A48B19FA639}"/>
               </a:ext>
             </a:extLst>
           </p:cNvPr>
@@ -4878,7 +4908,7 @@
           <p:cNvPr id="3" name="Content Placeholder 2">
             <a:extLst>
               <a:ext uri="{FF2B5EF4-FFF2-40B4-BE49-F238E27FC236}">
-                <a16:creationId xmlns:a16="http://schemas.microsoft.com/office/drawing/2014/main" id="{B97C3B36-8A9E-461B-A8C1-3DAD6B0B8DC9}"/>
+                <a16:creationId xmlns:a16="http://schemas.microsoft.com/office/drawing/2014/main" xmlns="" id="{B97C3B36-8A9E-461B-A8C1-3DAD6B0B8DC9}"/>
               </a:ext>
             </a:extLst>
           </p:cNvPr>
@@ -5183,6 +5213,13 @@
   <p:clrMapOvr>
     <a:masterClrMapping/>
   </p:clrMapOvr>
+  <p:timing>
+    <p:tnLst>
+      <p:par>
+        <p:cTn id="1" dur="indefinite" restart="never" nodeType="tmRoot"/>
+      </p:par>
+    </p:tnLst>
+  </p:timing>
 </p:sld>
 </file>
 
@@ -5208,7 +5245,7 @@
           <p:cNvPr id="2" name="Title 1">
             <a:extLst>
               <a:ext uri="{FF2B5EF4-FFF2-40B4-BE49-F238E27FC236}">
-                <a16:creationId xmlns:a16="http://schemas.microsoft.com/office/drawing/2014/main" id="{31590CAC-A7F6-4019-94CF-426A5A30BFBB}"/>
+                <a16:creationId xmlns:a16="http://schemas.microsoft.com/office/drawing/2014/main" xmlns="" id="{31590CAC-A7F6-4019-94CF-426A5A30BFBB}"/>
               </a:ext>
             </a:extLst>
           </p:cNvPr>
@@ -5237,7 +5274,7 @@
           <p:cNvPr id="3" name="Content Placeholder 2">
             <a:extLst>
               <a:ext uri="{FF2B5EF4-FFF2-40B4-BE49-F238E27FC236}">
-                <a16:creationId xmlns:a16="http://schemas.microsoft.com/office/drawing/2014/main" id="{BE7C0233-B831-4B41-AA7E-49605063A8E3}"/>
+                <a16:creationId xmlns:a16="http://schemas.microsoft.com/office/drawing/2014/main" xmlns="" id="{BE7C0233-B831-4B41-AA7E-49605063A8E3}"/>
               </a:ext>
             </a:extLst>
           </p:cNvPr>
@@ -5455,7 +5492,40 @@
             </a:pPr>
             <a:r>
               <a:rPr lang="en-US" sz="2000" dirty="0"/>
-              <a:t>       </a:t>
+              <a:t>  </a:t>
+            </a:r>
+            <a:r>
+              <a:rPr lang="en-US" sz="2000" dirty="0" smtClean="0"/>
+              <a:t>    </a:t>
+            </a:r>
+            <a:r>
+              <a:rPr lang="en-US" sz="2000" dirty="0" smtClean="0">
+                <a:solidFill>
+                  <a:srgbClr val="0070C0"/>
+                </a:solidFill>
+              </a:rPr>
+              <a:t> if</a:t>
+            </a:r>
+            <a:r>
+              <a:rPr lang="en-US" sz="2000" dirty="0"/>
+              <a:t>(!</a:t>
+            </a:r>
+            <a:r>
+              <a:rPr lang="en-US" sz="2000" dirty="0" err="1"/>
+              <a:t>weatherThread.isAlive</a:t>
+            </a:r>
+            <a:r>
+              <a:rPr lang="en-US" sz="2000" dirty="0"/>
+              <a:t>()) {</a:t>
+            </a:r>
+          </a:p>
+          <a:p>
+            <a:pPr marL="0" indent="0">
+              <a:buNone/>
+            </a:pPr>
+            <a:r>
+              <a:rPr lang="en-US" sz="2000" dirty="0"/>
+              <a:t>            </a:t>
             </a:r>
             <a:r>
               <a:rPr lang="en-US" sz="2000" dirty="0" err="1"/>
@@ -5470,6 +5540,10 @@
             <a:pPr marL="0" indent="0">
               <a:buNone/>
             </a:pPr>
+            <a:r>
+              <a:rPr lang="en-US" sz="2000" dirty="0"/>
+              <a:t>        }</a:t>
+            </a:r>
             <a:endParaRPr lang="en-US" sz="2000" dirty="0"/>
           </a:p>
           <a:p>
@@ -5532,6 +5606,955 @@
   <p:clrMapOvr>
     <a:masterClrMapping/>
   </p:clrMapOvr>
+  <p:timing>
+    <p:tnLst>
+      <p:par>
+        <p:cTn id="1" dur="indefinite" restart="never" nodeType="tmRoot"/>
+      </p:par>
+    </p:tnLst>
+  </p:timing>
+</p:sld>
+</file>
+
+<file path=ppt/slides/slide16.xml><?xml version="1.0" encoding="utf-8"?>
+<p:sld xmlns:a="http://schemas.openxmlformats.org/drawingml/2006/main" xmlns:r="http://schemas.openxmlformats.org/officeDocument/2006/relationships" xmlns:p="http://schemas.openxmlformats.org/presentationml/2006/main">
+  <p:cSld>
+    <p:spTree>
+      <p:nvGrpSpPr>
+        <p:cNvPr id="1" name=""/>
+        <p:cNvGrpSpPr/>
+        <p:nvPr/>
+      </p:nvGrpSpPr>
+      <p:grpSpPr>
+        <a:xfrm>
+          <a:off x="0" y="0"/>
+          <a:ext cx="0" cy="0"/>
+          <a:chOff x="0" y="0"/>
+          <a:chExt cx="0" cy="0"/>
+        </a:xfrm>
+      </p:grpSpPr>
+      <p:sp>
+        <p:nvSpPr>
+          <p:cNvPr id="2" name="Title 1"/>
+          <p:cNvSpPr>
+            <a:spLocks noGrp="1"/>
+          </p:cNvSpPr>
+          <p:nvPr>
+            <p:ph type="title"/>
+          </p:nvPr>
+        </p:nvSpPr>
+        <p:spPr/>
+        <p:txBody>
+          <a:bodyPr/>
+          <a:lstStyle/>
+          <a:p>
+            <a:r>
+              <a:rPr lang="en-US" dirty="0" smtClean="0"/>
+              <a:t>Create Notification</a:t>
+            </a:r>
+            <a:endParaRPr lang="en-US" dirty="0"/>
+          </a:p>
+        </p:txBody>
+      </p:sp>
+      <p:sp>
+        <p:nvSpPr>
+          <p:cNvPr id="3" name="Content Placeholder 2"/>
+          <p:cNvSpPr>
+            <a:spLocks noGrp="1"/>
+          </p:cNvSpPr>
+          <p:nvPr>
+            <p:ph idx="1"/>
+          </p:nvPr>
+        </p:nvSpPr>
+        <p:spPr/>
+        <p:txBody>
+          <a:bodyPr>
+            <a:normAutofit fontScale="47500" lnSpcReduction="20000"/>
+          </a:bodyPr>
+          <a:lstStyle/>
+          <a:p>
+            <a:pPr marL="0" indent="0">
+              <a:buNone/>
+            </a:pPr>
+            <a:r>
+              <a:rPr lang="en-US" dirty="0"/>
+              <a:t> </a:t>
+            </a:r>
+            <a:r>
+              <a:rPr lang="en-US" dirty="0">
+                <a:solidFill>
+                  <a:srgbClr val="0070C0"/>
+                </a:solidFill>
+              </a:rPr>
+              <a:t>private</a:t>
+            </a:r>
+            <a:r>
+              <a:rPr lang="en-US" dirty="0"/>
+              <a:t> Notification </a:t>
+            </a:r>
+            <a:r>
+              <a:rPr lang="en-US" dirty="0" err="1"/>
+              <a:t>getNotification</a:t>
+            </a:r>
+            <a:r>
+              <a:rPr lang="en-US" dirty="0"/>
+              <a:t>() {</a:t>
+            </a:r>
+          </a:p>
+          <a:p>
+            <a:pPr marL="0" indent="0">
+              <a:buNone/>
+            </a:pPr>
+            <a:r>
+              <a:rPr lang="en-US" dirty="0"/>
+              <a:t>        Intent </a:t>
+            </a:r>
+            <a:r>
+              <a:rPr lang="en-US" dirty="0" err="1"/>
+              <a:t>notificationIntent</a:t>
+            </a:r>
+            <a:r>
+              <a:rPr lang="en-US" dirty="0"/>
+              <a:t> = </a:t>
+            </a:r>
+            <a:r>
+              <a:rPr lang="en-US" dirty="0">
+                <a:solidFill>
+                  <a:srgbClr val="0070C0"/>
+                </a:solidFill>
+              </a:rPr>
+              <a:t>new</a:t>
+            </a:r>
+            <a:r>
+              <a:rPr lang="en-US" dirty="0"/>
+              <a:t> Intent(</a:t>
+            </a:r>
+            <a:r>
+              <a:rPr lang="en-US" dirty="0">
+                <a:solidFill>
+                  <a:srgbClr val="0070C0"/>
+                </a:solidFill>
+              </a:rPr>
+              <a:t>this</a:t>
+            </a:r>
+            <a:r>
+              <a:rPr lang="en-US" dirty="0"/>
+              <a:t>, </a:t>
+            </a:r>
+            <a:r>
+              <a:rPr lang="en-US" dirty="0" err="1"/>
+              <a:t>MainActivity.class</a:t>
+            </a:r>
+            <a:r>
+              <a:rPr lang="en-US" dirty="0"/>
+              <a:t>);</a:t>
+            </a:r>
+          </a:p>
+          <a:p>
+            <a:pPr marL="0" indent="0">
+              <a:buNone/>
+            </a:pPr>
+            <a:r>
+              <a:rPr lang="en-US" dirty="0"/>
+              <a:t>        </a:t>
+            </a:r>
+            <a:r>
+              <a:rPr lang="en-US" dirty="0" err="1"/>
+              <a:t>PendingIntent</a:t>
+            </a:r>
+            <a:r>
+              <a:rPr lang="en-US" dirty="0"/>
+              <a:t> </a:t>
+            </a:r>
+            <a:r>
+              <a:rPr lang="en-US" dirty="0" err="1"/>
+              <a:t>pendingIntent</a:t>
+            </a:r>
+            <a:r>
+              <a:rPr lang="en-US" dirty="0"/>
+              <a:t> = </a:t>
+            </a:r>
+            <a:r>
+              <a:rPr lang="en-US" dirty="0" err="1"/>
+              <a:t>PendingIntent.getActivity</a:t>
+            </a:r>
+            <a:r>
+              <a:rPr lang="en-US" dirty="0"/>
+              <a:t>(</a:t>
+            </a:r>
+            <a:r>
+              <a:rPr lang="en-US" dirty="0">
+                <a:solidFill>
+                  <a:srgbClr val="0070C0"/>
+                </a:solidFill>
+              </a:rPr>
+              <a:t>this</a:t>
+            </a:r>
+            <a:r>
+              <a:rPr lang="en-US" dirty="0"/>
+              <a:t>, 0, </a:t>
+            </a:r>
+            <a:r>
+              <a:rPr lang="en-US" dirty="0" err="1"/>
+              <a:t>notificationIntent</a:t>
+            </a:r>
+            <a:r>
+              <a:rPr lang="en-US" dirty="0"/>
+              <a:t>, 0);</a:t>
+            </a:r>
+          </a:p>
+          <a:p>
+            <a:pPr marL="0" indent="0">
+              <a:buNone/>
+            </a:pPr>
+            <a:endParaRPr lang="en-US" dirty="0"/>
+          </a:p>
+          <a:p>
+            <a:pPr marL="0" indent="0">
+              <a:buNone/>
+            </a:pPr>
+            <a:r>
+              <a:rPr lang="en-US" dirty="0"/>
+              <a:t>        </a:t>
+            </a:r>
+            <a:r>
+              <a:rPr lang="en-US" dirty="0" err="1"/>
+              <a:t>NotificationCompat.Builder</a:t>
+            </a:r>
+            <a:r>
+              <a:rPr lang="en-US" dirty="0"/>
+              <a:t> builder =</a:t>
+            </a:r>
+          </a:p>
+          <a:p>
+            <a:pPr marL="0" indent="0">
+              <a:buNone/>
+            </a:pPr>
+            <a:r>
+              <a:rPr lang="en-US" dirty="0"/>
+              <a:t>                </a:t>
+            </a:r>
+            <a:r>
+              <a:rPr lang="en-US" dirty="0">
+                <a:solidFill>
+                  <a:srgbClr val="0070C0"/>
+                </a:solidFill>
+              </a:rPr>
+              <a:t>new</a:t>
+            </a:r>
+            <a:r>
+              <a:rPr lang="en-US" dirty="0"/>
+              <a:t> </a:t>
+            </a:r>
+            <a:r>
+              <a:rPr lang="en-US" dirty="0" err="1"/>
+              <a:t>NotificationCompat.Builder</a:t>
+            </a:r>
+            <a:r>
+              <a:rPr lang="en-US" dirty="0"/>
+              <a:t>(</a:t>
+            </a:r>
+            <a:r>
+              <a:rPr lang="en-US" dirty="0">
+                <a:solidFill>
+                  <a:srgbClr val="0070C0"/>
+                </a:solidFill>
+              </a:rPr>
+              <a:t>this</a:t>
+            </a:r>
+            <a:r>
+              <a:rPr lang="en-US" dirty="0"/>
+              <a:t>)</a:t>
+            </a:r>
+          </a:p>
+          <a:p>
+            <a:pPr marL="0" indent="0">
+              <a:buNone/>
+            </a:pPr>
+            <a:r>
+              <a:rPr lang="en-US" dirty="0"/>
+              <a:t>                        .</a:t>
+            </a:r>
+            <a:r>
+              <a:rPr lang="en-US" dirty="0" err="1"/>
+              <a:t>setContentTitle</a:t>
+            </a:r>
+            <a:r>
+              <a:rPr lang="en-US" dirty="0"/>
+              <a:t>(</a:t>
+            </a:r>
+            <a:r>
+              <a:rPr lang="en-US" dirty="0" err="1"/>
+              <a:t>getText</a:t>
+            </a:r>
+            <a:r>
+              <a:rPr lang="en-US" dirty="0"/>
+              <a:t>(</a:t>
+            </a:r>
+            <a:r>
+              <a:rPr lang="en-US" dirty="0" err="1"/>
+              <a:t>R.string.notification_title</a:t>
+            </a:r>
+            <a:r>
+              <a:rPr lang="en-US" dirty="0"/>
+              <a:t>))</a:t>
+            </a:r>
+          </a:p>
+          <a:p>
+            <a:pPr marL="0" indent="0">
+              <a:buNone/>
+            </a:pPr>
+            <a:r>
+              <a:rPr lang="en-US" dirty="0"/>
+              <a:t>                        .</a:t>
+            </a:r>
+            <a:r>
+              <a:rPr lang="en-US" dirty="0" err="1"/>
+              <a:t>setContentText</a:t>
+            </a:r>
+            <a:r>
+              <a:rPr lang="en-US" dirty="0"/>
+              <a:t>(</a:t>
+            </a:r>
+            <a:r>
+              <a:rPr lang="en-US" dirty="0" err="1"/>
+              <a:t>getText</a:t>
+            </a:r>
+            <a:r>
+              <a:rPr lang="en-US" dirty="0"/>
+              <a:t>(</a:t>
+            </a:r>
+            <a:r>
+              <a:rPr lang="en-US" dirty="0" err="1"/>
+              <a:t>R.string.notification_message</a:t>
+            </a:r>
+            <a:r>
+              <a:rPr lang="en-US" dirty="0"/>
+              <a:t>))</a:t>
+            </a:r>
+          </a:p>
+          <a:p>
+            <a:pPr marL="0" indent="0">
+              <a:buNone/>
+            </a:pPr>
+            <a:r>
+              <a:rPr lang="en-US" dirty="0"/>
+              <a:t>                        .</a:t>
+            </a:r>
+            <a:r>
+              <a:rPr lang="en-US" dirty="0" err="1"/>
+              <a:t>setSmallIcon</a:t>
+            </a:r>
+            <a:r>
+              <a:rPr lang="en-US" dirty="0"/>
+              <a:t>(</a:t>
+            </a:r>
+            <a:r>
+              <a:rPr lang="en-US" dirty="0" err="1"/>
+              <a:t>R.mipmap.ic_launcher_round</a:t>
+            </a:r>
+            <a:r>
+              <a:rPr lang="en-US" dirty="0"/>
+              <a:t>)</a:t>
+            </a:r>
+          </a:p>
+          <a:p>
+            <a:pPr marL="0" indent="0">
+              <a:buNone/>
+            </a:pPr>
+            <a:r>
+              <a:rPr lang="en-US" dirty="0"/>
+              <a:t>                        .</a:t>
+            </a:r>
+            <a:r>
+              <a:rPr lang="en-US" dirty="0" err="1"/>
+              <a:t>setContentIntent</a:t>
+            </a:r>
+            <a:r>
+              <a:rPr lang="en-US" dirty="0"/>
+              <a:t>(</a:t>
+            </a:r>
+            <a:r>
+              <a:rPr lang="en-US" dirty="0" err="1"/>
+              <a:t>pendingIntent</a:t>
+            </a:r>
+            <a:r>
+              <a:rPr lang="en-US" dirty="0"/>
+              <a:t>);</a:t>
+            </a:r>
+          </a:p>
+          <a:p>
+            <a:pPr marL="0" indent="0">
+              <a:buNone/>
+            </a:pPr>
+            <a:endParaRPr lang="en-US" dirty="0"/>
+          </a:p>
+          <a:p>
+            <a:pPr marL="0" indent="0">
+              <a:buNone/>
+            </a:pPr>
+            <a:r>
+              <a:rPr lang="en-US" dirty="0"/>
+              <a:t>        </a:t>
+            </a:r>
+            <a:r>
+              <a:rPr lang="en-US" dirty="0">
+                <a:solidFill>
+                  <a:srgbClr val="0070C0"/>
+                </a:solidFill>
+              </a:rPr>
+              <a:t>return</a:t>
+            </a:r>
+            <a:r>
+              <a:rPr lang="en-US" dirty="0"/>
+              <a:t> </a:t>
+            </a:r>
+            <a:r>
+              <a:rPr lang="en-US" dirty="0" err="1"/>
+              <a:t>builder.build</a:t>
+            </a:r>
+            <a:r>
+              <a:rPr lang="en-US" dirty="0"/>
+              <a:t>();</a:t>
+            </a:r>
+          </a:p>
+          <a:p>
+            <a:pPr marL="0" indent="0">
+              <a:buNone/>
+            </a:pPr>
+            <a:r>
+              <a:rPr lang="en-US" dirty="0"/>
+              <a:t>    }</a:t>
+            </a:r>
+          </a:p>
+        </p:txBody>
+      </p:sp>
+    </p:spTree>
+    <p:extLst>
+      <p:ext uri="{BB962C8B-B14F-4D97-AF65-F5344CB8AC3E}">
+        <p14:creationId xmlns:p14="http://schemas.microsoft.com/office/powerpoint/2010/main" val="1014310827"/>
+      </p:ext>
+    </p:extLst>
+  </p:cSld>
+  <p:clrMapOvr>
+    <a:masterClrMapping/>
+  </p:clrMapOvr>
+  <p:timing>
+    <p:tnLst>
+      <p:par>
+        <p:cTn id="1" dur="indefinite" restart="never" nodeType="tmRoot"/>
+      </p:par>
+    </p:tnLst>
+  </p:timing>
+</p:sld>
+</file>
+
+<file path=ppt/slides/slide17.xml><?xml version="1.0" encoding="utf-8"?>
+<p:sld xmlns:a="http://schemas.openxmlformats.org/drawingml/2006/main" xmlns:r="http://schemas.openxmlformats.org/officeDocument/2006/relationships" xmlns:p="http://schemas.openxmlformats.org/presentationml/2006/main">
+  <p:cSld>
+    <p:spTree>
+      <p:nvGrpSpPr>
+        <p:cNvPr id="1" name=""/>
+        <p:cNvGrpSpPr/>
+        <p:nvPr/>
+      </p:nvGrpSpPr>
+      <p:grpSpPr>
+        <a:xfrm>
+          <a:off x="0" y="0"/>
+          <a:ext cx="0" cy="0"/>
+          <a:chOff x="0" y="0"/>
+          <a:chExt cx="0" cy="0"/>
+        </a:xfrm>
+      </p:grpSpPr>
+      <p:sp>
+        <p:nvSpPr>
+          <p:cNvPr id="2" name="Title 1"/>
+          <p:cNvSpPr>
+            <a:spLocks noGrp="1"/>
+          </p:cNvSpPr>
+          <p:nvPr>
+            <p:ph type="title"/>
+          </p:nvPr>
+        </p:nvSpPr>
+        <p:spPr/>
+        <p:txBody>
+          <a:bodyPr/>
+          <a:lstStyle/>
+          <a:p>
+            <a:r>
+              <a:rPr lang="en-US" dirty="0" smtClean="0"/>
+              <a:t>Create Foreground Service </a:t>
+            </a:r>
+            <a:endParaRPr lang="en-US" dirty="0"/>
+          </a:p>
+        </p:txBody>
+      </p:sp>
+      <p:sp>
+        <p:nvSpPr>
+          <p:cNvPr id="3" name="Content Placeholder 2"/>
+          <p:cNvSpPr>
+            <a:spLocks noGrp="1"/>
+          </p:cNvSpPr>
+          <p:nvPr>
+            <p:ph idx="1"/>
+          </p:nvPr>
+        </p:nvSpPr>
+        <p:spPr/>
+        <p:txBody>
+          <a:bodyPr>
+            <a:normAutofit/>
+          </a:bodyPr>
+          <a:lstStyle/>
+          <a:p>
+            <a:pPr marL="0" indent="0">
+              <a:buNone/>
+            </a:pPr>
+            <a:r>
+              <a:rPr lang="en-US" sz="2000" dirty="0">
+                <a:solidFill>
+                  <a:srgbClr val="FFC000"/>
+                </a:solidFill>
+              </a:rPr>
+              <a:t> </a:t>
+            </a:r>
+            <a:r>
+              <a:rPr lang="en-US" sz="2000" dirty="0" smtClean="0">
+                <a:solidFill>
+                  <a:srgbClr val="FFC000"/>
+                </a:solidFill>
+              </a:rPr>
+              <a:t>   @</a:t>
+            </a:r>
+            <a:r>
+              <a:rPr lang="en-US" sz="2000" dirty="0">
+                <a:solidFill>
+                  <a:srgbClr val="FFC000"/>
+                </a:solidFill>
+              </a:rPr>
+              <a:t>Override</a:t>
+            </a:r>
+          </a:p>
+          <a:p>
+            <a:pPr marL="0" indent="0">
+              <a:buNone/>
+            </a:pPr>
+            <a:r>
+              <a:rPr lang="en-US" sz="2000" dirty="0"/>
+              <a:t>    </a:t>
+            </a:r>
+            <a:r>
+              <a:rPr lang="en-US" sz="2000" dirty="0">
+                <a:solidFill>
+                  <a:srgbClr val="7030A0"/>
+                </a:solidFill>
+              </a:rPr>
+              <a:t>public </a:t>
+            </a:r>
+            <a:r>
+              <a:rPr lang="en-US" sz="2000" dirty="0" err="1">
+                <a:solidFill>
+                  <a:srgbClr val="7030A0"/>
+                </a:solidFill>
+              </a:rPr>
+              <a:t>int</a:t>
+            </a:r>
+            <a:r>
+              <a:rPr lang="en-US" sz="2000" dirty="0">
+                <a:solidFill>
+                  <a:srgbClr val="7030A0"/>
+                </a:solidFill>
+              </a:rPr>
+              <a:t> </a:t>
+            </a:r>
+            <a:r>
+              <a:rPr lang="en-US" sz="2000" dirty="0" err="1"/>
+              <a:t>onStartCommand</a:t>
+            </a:r>
+            <a:r>
+              <a:rPr lang="en-US" sz="2000" dirty="0"/>
+              <a:t>(Intent </a:t>
+            </a:r>
+            <a:r>
+              <a:rPr lang="en-US" sz="2000" dirty="0" err="1"/>
+              <a:t>intent</a:t>
+            </a:r>
+            <a:r>
+              <a:rPr lang="en-US" sz="2000" dirty="0"/>
+              <a:t>, </a:t>
+            </a:r>
+            <a:r>
+              <a:rPr lang="en-US" sz="2000" dirty="0" err="1">
+                <a:solidFill>
+                  <a:srgbClr val="0070C0"/>
+                </a:solidFill>
+              </a:rPr>
+              <a:t>int</a:t>
+            </a:r>
+            <a:r>
+              <a:rPr lang="en-US" sz="2000" dirty="0">
+                <a:solidFill>
+                  <a:srgbClr val="0070C0"/>
+                </a:solidFill>
+              </a:rPr>
+              <a:t> </a:t>
+            </a:r>
+            <a:r>
+              <a:rPr lang="en-US" sz="2000" dirty="0"/>
+              <a:t>flags, </a:t>
+            </a:r>
+            <a:r>
+              <a:rPr lang="en-US" sz="2000" dirty="0" err="1">
+                <a:solidFill>
+                  <a:srgbClr val="0070C0"/>
+                </a:solidFill>
+              </a:rPr>
+              <a:t>int</a:t>
+            </a:r>
+            <a:r>
+              <a:rPr lang="en-US" sz="2000" dirty="0"/>
+              <a:t> </a:t>
+            </a:r>
+            <a:r>
+              <a:rPr lang="en-US" sz="2000" dirty="0" err="1"/>
+              <a:t>startId</a:t>
+            </a:r>
+            <a:r>
+              <a:rPr lang="en-US" sz="2000" dirty="0"/>
+              <a:t>) {</a:t>
+            </a:r>
+          </a:p>
+          <a:p>
+            <a:pPr marL="0" indent="0">
+              <a:buNone/>
+            </a:pPr>
+            <a:r>
+              <a:rPr lang="en-US" sz="2000" dirty="0"/>
+              <a:t>        </a:t>
+            </a:r>
+            <a:r>
+              <a:rPr lang="en-US" sz="2000" dirty="0" err="1">
+                <a:solidFill>
+                  <a:srgbClr val="0070C0"/>
+                </a:solidFill>
+              </a:rPr>
+              <a:t>super</a:t>
+            </a:r>
+            <a:r>
+              <a:rPr lang="en-US" sz="2000" dirty="0" err="1"/>
+              <a:t>.onStartCommand</a:t>
+            </a:r>
+            <a:r>
+              <a:rPr lang="en-US" sz="2000" dirty="0"/>
+              <a:t>(</a:t>
+            </a:r>
+            <a:r>
+              <a:rPr lang="en-US" sz="2000" dirty="0" err="1"/>
+              <a:t>intent,flags,startId</a:t>
+            </a:r>
+            <a:r>
+              <a:rPr lang="en-US" sz="2000" dirty="0"/>
+              <a:t>);</a:t>
+            </a:r>
+          </a:p>
+          <a:p>
+            <a:pPr marL="0" indent="0">
+              <a:buNone/>
+            </a:pPr>
+            <a:endParaRPr lang="en-US" sz="2000" dirty="0"/>
+          </a:p>
+          <a:p>
+            <a:pPr marL="0" indent="0">
+              <a:buNone/>
+            </a:pPr>
+            <a:r>
+              <a:rPr lang="en-US" sz="2000" dirty="0"/>
+              <a:t>        </a:t>
+            </a:r>
+            <a:r>
+              <a:rPr lang="en-US" sz="2000" dirty="0" err="1"/>
+              <a:t>startForeground</a:t>
+            </a:r>
+            <a:r>
+              <a:rPr lang="en-US" sz="2000" dirty="0"/>
+              <a:t>(NOTIFICATION_ID</a:t>
+            </a:r>
+            <a:r>
+              <a:rPr lang="en-US" sz="2000" dirty="0" smtClean="0"/>
+              <a:t>, </a:t>
+            </a:r>
+            <a:r>
+              <a:rPr lang="en-US" sz="2000" dirty="0" err="1" smtClean="0"/>
+              <a:t>getNotification</a:t>
+            </a:r>
+            <a:r>
+              <a:rPr lang="en-US" sz="2000" dirty="0" smtClean="0"/>
+              <a:t>()); </a:t>
+            </a:r>
+            <a:endParaRPr lang="en-US" sz="2000" dirty="0"/>
+          </a:p>
+          <a:p>
+            <a:pPr marL="0" indent="0">
+              <a:buNone/>
+            </a:pPr>
+            <a:endParaRPr lang="en-US" sz="2000" dirty="0"/>
+          </a:p>
+          <a:p>
+            <a:pPr marL="0" indent="0">
+              <a:buNone/>
+            </a:pPr>
+            <a:r>
+              <a:rPr lang="en-US" sz="2000" dirty="0"/>
+              <a:t>        if(!</a:t>
+            </a:r>
+            <a:r>
+              <a:rPr lang="en-US" sz="2000" dirty="0" err="1"/>
+              <a:t>weatherThread.isAlive</a:t>
+            </a:r>
+            <a:r>
+              <a:rPr lang="en-US" sz="2000" dirty="0"/>
+              <a:t>()) {</a:t>
+            </a:r>
+          </a:p>
+          <a:p>
+            <a:pPr marL="0" indent="0">
+              <a:buNone/>
+            </a:pPr>
+            <a:r>
+              <a:rPr lang="en-US" sz="2000" dirty="0"/>
+              <a:t>            </a:t>
+            </a:r>
+            <a:r>
+              <a:rPr lang="en-US" sz="2000" dirty="0" err="1"/>
+              <a:t>weatherThread.start</a:t>
+            </a:r>
+            <a:r>
+              <a:rPr lang="en-US" sz="2000" dirty="0"/>
+              <a:t>();</a:t>
+            </a:r>
+          </a:p>
+          <a:p>
+            <a:pPr marL="0" indent="0">
+              <a:buNone/>
+            </a:pPr>
+            <a:r>
+              <a:rPr lang="en-US" sz="2000" dirty="0"/>
+              <a:t>        }</a:t>
+            </a:r>
+          </a:p>
+          <a:p>
+            <a:pPr marL="0" indent="0">
+              <a:buNone/>
+            </a:pPr>
+            <a:r>
+              <a:rPr lang="en-US" sz="2000" dirty="0"/>
+              <a:t>        </a:t>
+            </a:r>
+            <a:r>
+              <a:rPr lang="en-US" sz="2000" dirty="0">
+                <a:solidFill>
+                  <a:srgbClr val="0070C0"/>
+                </a:solidFill>
+              </a:rPr>
+              <a:t>return</a:t>
+            </a:r>
+            <a:r>
+              <a:rPr lang="en-US" sz="2000" dirty="0"/>
+              <a:t> START_STICKY;</a:t>
+            </a:r>
+          </a:p>
+          <a:p>
+            <a:pPr marL="0" indent="0">
+              <a:buNone/>
+            </a:pPr>
+            <a:r>
+              <a:rPr lang="en-US" sz="2000" dirty="0"/>
+              <a:t>    }</a:t>
+            </a:r>
+          </a:p>
+        </p:txBody>
+      </p:sp>
+      <p:sp>
+        <p:nvSpPr>
+          <p:cNvPr id="5" name="Left Arrow 4"/>
+          <p:cNvSpPr/>
+          <p:nvPr/>
+        </p:nvSpPr>
+        <p:spPr>
+          <a:xfrm>
+            <a:off x="7564583" y="3093522"/>
+            <a:ext cx="2458192" cy="368135"/>
+          </a:xfrm>
+          <a:prstGeom prst="leftArrow">
+            <a:avLst/>
+          </a:prstGeom>
+        </p:spPr>
+        <p:style>
+          <a:lnRef idx="2">
+            <a:schemeClr val="accent1">
+              <a:shade val="50000"/>
+            </a:schemeClr>
+          </a:lnRef>
+          <a:fillRef idx="1">
+            <a:schemeClr val="accent1"/>
+          </a:fillRef>
+          <a:effectRef idx="0">
+            <a:schemeClr val="accent1"/>
+          </a:effectRef>
+          <a:fontRef idx="minor">
+            <a:schemeClr val="lt1"/>
+          </a:fontRef>
+        </p:style>
+        <p:txBody>
+          <a:bodyPr rtlCol="0" anchor="ctr"/>
+          <a:lstStyle/>
+          <a:p>
+            <a:pPr algn="ctr"/>
+            <a:endParaRPr lang="en-US"/>
+          </a:p>
+        </p:txBody>
+      </p:sp>
+    </p:spTree>
+    <p:extLst>
+      <p:ext uri="{BB962C8B-B14F-4D97-AF65-F5344CB8AC3E}">
+        <p14:creationId xmlns:p14="http://schemas.microsoft.com/office/powerpoint/2010/main" val="3856765840"/>
+      </p:ext>
+    </p:extLst>
+  </p:cSld>
+  <p:clrMapOvr>
+    <a:masterClrMapping/>
+  </p:clrMapOvr>
+  <p:timing>
+    <p:tnLst>
+      <p:par>
+        <p:cTn id="1" dur="indefinite" restart="never" nodeType="tmRoot">
+          <p:childTnLst>
+            <p:seq concurrent="1" nextAc="seek">
+              <p:cTn id="2" dur="indefinite" nodeType="mainSeq">
+                <p:childTnLst>
+                  <p:par>
+                    <p:cTn id="3" fill="hold">
+                      <p:stCondLst>
+                        <p:cond delay="indefinite"/>
+                      </p:stCondLst>
+                      <p:childTnLst>
+                        <p:par>
+                          <p:cTn id="4" fill="hold">
+                            <p:stCondLst>
+                              <p:cond delay="0"/>
+                            </p:stCondLst>
+                            <p:childTnLst>
+                              <p:par>
+                                <p:cTn id="5" presetID="53" presetClass="entr" presetSubtype="16" fill="hold" grpId="0" nodeType="clickEffect">
+                                  <p:stCondLst>
+                                    <p:cond delay="0"/>
+                                  </p:stCondLst>
+                                  <p:childTnLst>
+                                    <p:set>
+                                      <p:cBhvr>
+                                        <p:cTn id="6" dur="1" fill="hold">
+                                          <p:stCondLst>
+                                            <p:cond delay="0"/>
+                                          </p:stCondLst>
+                                        </p:cTn>
+                                        <p:tgtEl>
+                                          <p:spTgt spid="5"/>
+                                        </p:tgtEl>
+                                        <p:attrNameLst>
+                                          <p:attrName>style.visibility</p:attrName>
+                                        </p:attrNameLst>
+                                      </p:cBhvr>
+                                      <p:to>
+                                        <p:strVal val="visible"/>
+                                      </p:to>
+                                    </p:set>
+                                    <p:anim calcmode="lin" valueType="num">
+                                      <p:cBhvr>
+                                        <p:cTn id="7" dur="500" fill="hold"/>
+                                        <p:tgtEl>
+                                          <p:spTgt spid="5"/>
+                                        </p:tgtEl>
+                                        <p:attrNameLst>
+                                          <p:attrName>ppt_w</p:attrName>
+                                        </p:attrNameLst>
+                                      </p:cBhvr>
+                                      <p:tavLst>
+                                        <p:tav tm="0">
+                                          <p:val>
+                                            <p:fltVal val="0"/>
+                                          </p:val>
+                                        </p:tav>
+                                        <p:tav tm="100000">
+                                          <p:val>
+                                            <p:strVal val="#ppt_w"/>
+                                          </p:val>
+                                        </p:tav>
+                                      </p:tavLst>
+                                    </p:anim>
+                                    <p:anim calcmode="lin" valueType="num">
+                                      <p:cBhvr>
+                                        <p:cTn id="8" dur="500" fill="hold"/>
+                                        <p:tgtEl>
+                                          <p:spTgt spid="5"/>
+                                        </p:tgtEl>
+                                        <p:attrNameLst>
+                                          <p:attrName>ppt_h</p:attrName>
+                                        </p:attrNameLst>
+                                      </p:cBhvr>
+                                      <p:tavLst>
+                                        <p:tav tm="0">
+                                          <p:val>
+                                            <p:fltVal val="0"/>
+                                          </p:val>
+                                        </p:tav>
+                                        <p:tav tm="100000">
+                                          <p:val>
+                                            <p:strVal val="#ppt_h"/>
+                                          </p:val>
+                                        </p:tav>
+                                      </p:tavLst>
+                                    </p:anim>
+                                    <p:animEffect transition="in" filter="fade">
+                                      <p:cBhvr>
+                                        <p:cTn id="9" dur="500"/>
+                                        <p:tgtEl>
+                                          <p:spTgt spid="5"/>
+                                        </p:tgtEl>
+                                      </p:cBhvr>
+                                    </p:animEffect>
+                                  </p:childTnLst>
+                                </p:cTn>
+                              </p:par>
+                            </p:childTnLst>
+                          </p:cTn>
+                        </p:par>
+                      </p:childTnLst>
+                    </p:cTn>
+                  </p:par>
+                </p:childTnLst>
+              </p:cTn>
+              <p:prevCondLst>
+                <p:cond evt="onPrev" delay="0">
+                  <p:tgtEl>
+                    <p:sldTgt/>
+                  </p:tgtEl>
+                </p:cond>
+              </p:prevCondLst>
+              <p:nextCondLst>
+                <p:cond evt="onNext" delay="0">
+                  <p:tgtEl>
+                    <p:sldTgt/>
+                  </p:tgtEl>
+                </p:cond>
+              </p:nextCondLst>
+            </p:seq>
+          </p:childTnLst>
+        </p:cTn>
+      </p:par>
+    </p:tnLst>
+    <p:bldLst>
+      <p:bldP spid="5" grpId="0" animBg="1"/>
+    </p:bldLst>
+  </p:timing>
 </p:sld>
 </file>
 
@@ -5557,7 +6580,7 @@
           <p:cNvPr id="3" name="Content Placeholder 2">
             <a:extLst>
               <a:ext uri="{FF2B5EF4-FFF2-40B4-BE49-F238E27FC236}">
-                <a16:creationId xmlns:a16="http://schemas.microsoft.com/office/drawing/2014/main" id="{08E703A8-D08A-40C4-9D66-12F2C301B63B}"/>
+                <a16:creationId xmlns:a16="http://schemas.microsoft.com/office/drawing/2014/main" xmlns="" id="{08E703A8-D08A-40C4-9D66-12F2C301B63B}"/>
               </a:ext>
             </a:extLst>
           </p:cNvPr>
@@ -5605,6 +6628,13 @@
   <p:clrMapOvr>
     <a:masterClrMapping/>
   </p:clrMapOvr>
+  <p:timing>
+    <p:tnLst>
+      <p:par>
+        <p:cTn id="1" dur="indefinite" restart="never" nodeType="tmRoot"/>
+      </p:par>
+    </p:tnLst>
+  </p:timing>
 </p:sld>
 </file>
 
@@ -5630,7 +6660,7 @@
           <p:cNvPr id="2" name="Title 1">
             <a:extLst>
               <a:ext uri="{FF2B5EF4-FFF2-40B4-BE49-F238E27FC236}">
-                <a16:creationId xmlns:a16="http://schemas.microsoft.com/office/drawing/2014/main" id="{00267D90-8F6E-410E-B140-E7EF5822F082}"/>
+                <a16:creationId xmlns:a16="http://schemas.microsoft.com/office/drawing/2014/main" xmlns="" id="{00267D90-8F6E-410E-B140-E7EF5822F082}"/>
               </a:ext>
             </a:extLst>
           </p:cNvPr>
@@ -5658,7 +6688,7 @@
           <p:cNvPr id="3" name="Content Placeholder 2">
             <a:extLst>
               <a:ext uri="{FF2B5EF4-FFF2-40B4-BE49-F238E27FC236}">
-                <a16:creationId xmlns:a16="http://schemas.microsoft.com/office/drawing/2014/main" id="{E057E826-053F-4E30-BCC2-D1A5F70A181C}"/>
+                <a16:creationId xmlns:a16="http://schemas.microsoft.com/office/drawing/2014/main" xmlns="" id="{E057E826-053F-4E30-BCC2-D1A5F70A181C}"/>
               </a:ext>
             </a:extLst>
           </p:cNvPr>
@@ -5699,6 +6729,13 @@
   <p:clrMapOvr>
     <a:masterClrMapping/>
   </p:clrMapOvr>
+  <p:timing>
+    <p:tnLst>
+      <p:par>
+        <p:cTn id="1" dur="indefinite" restart="never" nodeType="tmRoot"/>
+      </p:par>
+    </p:tnLst>
+  </p:timing>
 </p:sld>
 </file>
 
@@ -5724,7 +6761,7 @@
           <p:cNvPr id="2" name="Title 1">
             <a:extLst>
               <a:ext uri="{FF2B5EF4-FFF2-40B4-BE49-F238E27FC236}">
-                <a16:creationId xmlns:a16="http://schemas.microsoft.com/office/drawing/2014/main" id="{2D5F6D41-FD34-48A1-99E7-E66A69FEAC8B}"/>
+                <a16:creationId xmlns:a16="http://schemas.microsoft.com/office/drawing/2014/main" xmlns="" id="{2D5F6D41-FD34-48A1-99E7-E66A69FEAC8B}"/>
               </a:ext>
             </a:extLst>
           </p:cNvPr>
@@ -5752,7 +6789,7 @@
           <p:cNvPr id="3" name="Content Placeholder 2">
             <a:extLst>
               <a:ext uri="{FF2B5EF4-FFF2-40B4-BE49-F238E27FC236}">
-                <a16:creationId xmlns:a16="http://schemas.microsoft.com/office/drawing/2014/main" id="{D5CE508C-0569-4909-BCA7-53FA1A5D6142}"/>
+                <a16:creationId xmlns:a16="http://schemas.microsoft.com/office/drawing/2014/main" xmlns="" id="{D5CE508C-0569-4909-BCA7-53FA1A5D6142}"/>
               </a:ext>
             </a:extLst>
           </p:cNvPr>
@@ -5816,6 +6853,13 @@
   <p:clrMapOvr>
     <a:masterClrMapping/>
   </p:clrMapOvr>
+  <p:timing>
+    <p:tnLst>
+      <p:par>
+        <p:cTn id="1" dur="indefinite" restart="never" nodeType="tmRoot"/>
+      </p:par>
+    </p:tnLst>
+  </p:timing>
 </p:sld>
 </file>
 
@@ -5841,7 +6885,7 @@
           <p:cNvPr id="2" name="Title 1">
             <a:extLst>
               <a:ext uri="{FF2B5EF4-FFF2-40B4-BE49-F238E27FC236}">
-                <a16:creationId xmlns:a16="http://schemas.microsoft.com/office/drawing/2014/main" id="{B3D4D9FF-35FA-4524-8518-556DF2C86A7F}"/>
+                <a16:creationId xmlns:a16="http://schemas.microsoft.com/office/drawing/2014/main" xmlns="" id="{B3D4D9FF-35FA-4524-8518-556DF2C86A7F}"/>
               </a:ext>
             </a:extLst>
           </p:cNvPr>
@@ -5870,7 +6914,7 @@
           <p:cNvPr id="3" name="Content Placeholder 2">
             <a:extLst>
               <a:ext uri="{FF2B5EF4-FFF2-40B4-BE49-F238E27FC236}">
-                <a16:creationId xmlns:a16="http://schemas.microsoft.com/office/drawing/2014/main" id="{E3DAD111-70F8-4E42-977B-F57EE75EFFD1}"/>
+                <a16:creationId xmlns:a16="http://schemas.microsoft.com/office/drawing/2014/main" xmlns="" id="{E3DAD111-70F8-4E42-977B-F57EE75EFFD1}"/>
               </a:ext>
             </a:extLst>
           </p:cNvPr>
@@ -5932,6 +6976,13 @@
   <p:clrMapOvr>
     <a:masterClrMapping/>
   </p:clrMapOvr>
+  <p:timing>
+    <p:tnLst>
+      <p:par>
+        <p:cTn id="1" dur="indefinite" restart="never" nodeType="tmRoot"/>
+      </p:par>
+    </p:tnLst>
+  </p:timing>
 </p:sld>
 </file>
 
@@ -5957,7 +7008,7 @@
           <p:cNvPr id="2" name="Title 1">
             <a:extLst>
               <a:ext uri="{FF2B5EF4-FFF2-40B4-BE49-F238E27FC236}">
-                <a16:creationId xmlns:a16="http://schemas.microsoft.com/office/drawing/2014/main" id="{6937279D-980D-4DF7-A4CF-5D668463941A}"/>
+                <a16:creationId xmlns:a16="http://schemas.microsoft.com/office/drawing/2014/main" xmlns="" id="{6937279D-980D-4DF7-A4CF-5D668463941A}"/>
               </a:ext>
             </a:extLst>
           </p:cNvPr>
@@ -5985,7 +7036,7 @@
           <p:cNvPr id="4" name="Content Placeholder 3">
             <a:extLst>
               <a:ext uri="{FF2B5EF4-FFF2-40B4-BE49-F238E27FC236}">
-                <a16:creationId xmlns:a16="http://schemas.microsoft.com/office/drawing/2014/main" id="{6BFCAA9E-8A0D-4756-B208-F45FC9974D2F}"/>
+                <a16:creationId xmlns:a16="http://schemas.microsoft.com/office/drawing/2014/main" xmlns="" id="{6BFCAA9E-8A0D-4756-B208-F45FC9974D2F}"/>
               </a:ext>
             </a:extLst>
           </p:cNvPr>
@@ -6017,7 +7068,7 @@
           <p:cNvPr id="5" name="TextBox 4">
             <a:extLst>
               <a:ext uri="{FF2B5EF4-FFF2-40B4-BE49-F238E27FC236}">
-                <a16:creationId xmlns:a16="http://schemas.microsoft.com/office/drawing/2014/main" id="{36F7D2E2-470E-41D1-BA97-76C0BA03DDF7}"/>
+                <a16:creationId xmlns:a16="http://schemas.microsoft.com/office/drawing/2014/main" xmlns="" id="{36F7D2E2-470E-41D1-BA97-76C0BA03DDF7}"/>
               </a:ext>
             </a:extLst>
           </p:cNvPr>
@@ -6060,7 +7111,7 @@
           <p:cNvPr id="6" name="TextBox 5">
             <a:extLst>
               <a:ext uri="{FF2B5EF4-FFF2-40B4-BE49-F238E27FC236}">
-                <a16:creationId xmlns:a16="http://schemas.microsoft.com/office/drawing/2014/main" id="{766545FC-D4DE-4578-96E6-87A47314220B}"/>
+                <a16:creationId xmlns:a16="http://schemas.microsoft.com/office/drawing/2014/main" xmlns="" id="{766545FC-D4DE-4578-96E6-87A47314220B}"/>
               </a:ext>
             </a:extLst>
           </p:cNvPr>
@@ -6121,7 +7172,7 @@
           <p:cNvPr id="7" name="TextBox 6">
             <a:extLst>
               <a:ext uri="{FF2B5EF4-FFF2-40B4-BE49-F238E27FC236}">
-                <a16:creationId xmlns:a16="http://schemas.microsoft.com/office/drawing/2014/main" id="{1DE4ACB1-692E-418D-B5CD-B8666F49138D}"/>
+                <a16:creationId xmlns:a16="http://schemas.microsoft.com/office/drawing/2014/main" xmlns="" id="{1DE4ACB1-692E-418D-B5CD-B8666F49138D}"/>
               </a:ext>
             </a:extLst>
           </p:cNvPr>
@@ -6187,6 +7238,13 @@
   <p:clrMapOvr>
     <a:masterClrMapping/>
   </p:clrMapOvr>
+  <p:timing>
+    <p:tnLst>
+      <p:par>
+        <p:cTn id="1" dur="indefinite" restart="never" nodeType="tmRoot"/>
+      </p:par>
+    </p:tnLst>
+  </p:timing>
 </p:sld>
 </file>
 
@@ -6212,7 +7270,7 @@
           <p:cNvPr id="2" name="Title 1">
             <a:extLst>
               <a:ext uri="{FF2B5EF4-FFF2-40B4-BE49-F238E27FC236}">
-                <a16:creationId xmlns:a16="http://schemas.microsoft.com/office/drawing/2014/main" id="{8272E683-F26E-4E30-B478-70247A792673}"/>
+                <a16:creationId xmlns:a16="http://schemas.microsoft.com/office/drawing/2014/main" xmlns="" id="{8272E683-F26E-4E30-B478-70247A792673}"/>
               </a:ext>
             </a:extLst>
           </p:cNvPr>
@@ -6248,7 +7306,7 @@
           <p:cNvPr id="3" name="Content Placeholder 2">
             <a:extLst>
               <a:ext uri="{FF2B5EF4-FFF2-40B4-BE49-F238E27FC236}">
-                <a16:creationId xmlns:a16="http://schemas.microsoft.com/office/drawing/2014/main" id="{35A8704B-94B0-4A63-8837-BF588A085298}"/>
+                <a16:creationId xmlns:a16="http://schemas.microsoft.com/office/drawing/2014/main" xmlns="" id="{35A8704B-94B0-4A63-8837-BF588A085298}"/>
               </a:ext>
             </a:extLst>
           </p:cNvPr>
@@ -6287,6 +7345,13 @@
   <p:clrMapOvr>
     <a:masterClrMapping/>
   </p:clrMapOvr>
+  <p:timing>
+    <p:tnLst>
+      <p:par>
+        <p:cTn id="1" dur="indefinite" restart="never" nodeType="tmRoot"/>
+      </p:par>
+    </p:tnLst>
+  </p:timing>
 </p:sld>
 </file>
 
@@ -6312,7 +7377,7 @@
           <p:cNvPr id="2" name="Title 1">
             <a:extLst>
               <a:ext uri="{FF2B5EF4-FFF2-40B4-BE49-F238E27FC236}">
-                <a16:creationId xmlns:a16="http://schemas.microsoft.com/office/drawing/2014/main" id="{6937279D-980D-4DF7-A4CF-5D668463941A}"/>
+                <a16:creationId xmlns:a16="http://schemas.microsoft.com/office/drawing/2014/main" xmlns="" id="{6937279D-980D-4DF7-A4CF-5D668463941A}"/>
               </a:ext>
             </a:extLst>
           </p:cNvPr>
@@ -6340,7 +7405,7 @@
           <p:cNvPr id="4" name="Content Placeholder 3">
             <a:extLst>
               <a:ext uri="{FF2B5EF4-FFF2-40B4-BE49-F238E27FC236}">
-                <a16:creationId xmlns:a16="http://schemas.microsoft.com/office/drawing/2014/main" id="{6BFCAA9E-8A0D-4756-B208-F45FC9974D2F}"/>
+                <a16:creationId xmlns:a16="http://schemas.microsoft.com/office/drawing/2014/main" xmlns="" id="{6BFCAA9E-8A0D-4756-B208-F45FC9974D2F}"/>
               </a:ext>
             </a:extLst>
           </p:cNvPr>
@@ -6372,7 +7437,7 @@
           <p:cNvPr id="5" name="TextBox 4">
             <a:extLst>
               <a:ext uri="{FF2B5EF4-FFF2-40B4-BE49-F238E27FC236}">
-                <a16:creationId xmlns:a16="http://schemas.microsoft.com/office/drawing/2014/main" id="{36F7D2E2-470E-41D1-BA97-76C0BA03DDF7}"/>
+                <a16:creationId xmlns:a16="http://schemas.microsoft.com/office/drawing/2014/main" xmlns="" id="{36F7D2E2-470E-41D1-BA97-76C0BA03DDF7}"/>
               </a:ext>
             </a:extLst>
           </p:cNvPr>
@@ -6433,7 +7498,7 @@
           <p:cNvPr id="6" name="TextBox 5">
             <a:extLst>
               <a:ext uri="{FF2B5EF4-FFF2-40B4-BE49-F238E27FC236}">
-                <a16:creationId xmlns:a16="http://schemas.microsoft.com/office/drawing/2014/main" id="{766545FC-D4DE-4578-96E6-87A47314220B}"/>
+                <a16:creationId xmlns:a16="http://schemas.microsoft.com/office/drawing/2014/main" xmlns="" id="{766545FC-D4DE-4578-96E6-87A47314220B}"/>
               </a:ext>
             </a:extLst>
           </p:cNvPr>
@@ -6476,7 +7541,7 @@
           <p:cNvPr id="7" name="TextBox 6">
             <a:extLst>
               <a:ext uri="{FF2B5EF4-FFF2-40B4-BE49-F238E27FC236}">
-                <a16:creationId xmlns:a16="http://schemas.microsoft.com/office/drawing/2014/main" id="{1DE4ACB1-692E-418D-B5CD-B8666F49138D}"/>
+                <a16:creationId xmlns:a16="http://schemas.microsoft.com/office/drawing/2014/main" xmlns="" id="{1DE4ACB1-692E-418D-B5CD-B8666F49138D}"/>
               </a:ext>
             </a:extLst>
           </p:cNvPr>
@@ -6542,6 +7607,13 @@
   <p:clrMapOvr>
     <a:masterClrMapping/>
   </p:clrMapOvr>
+  <p:timing>
+    <p:tnLst>
+      <p:par>
+        <p:cTn id="1" dur="indefinite" restart="never" nodeType="tmRoot"/>
+      </p:par>
+    </p:tnLst>
+  </p:timing>
 </p:sld>
 </file>
 
@@ -6567,7 +7639,7 @@
           <p:cNvPr id="2" name="Title 1">
             <a:extLst>
               <a:ext uri="{FF2B5EF4-FFF2-40B4-BE49-F238E27FC236}">
-                <a16:creationId xmlns:a16="http://schemas.microsoft.com/office/drawing/2014/main" id="{8EA3BD79-53B3-4C5B-8E6C-8302C242D467}"/>
+                <a16:creationId xmlns:a16="http://schemas.microsoft.com/office/drawing/2014/main" xmlns="" id="{8EA3BD79-53B3-4C5B-8E6C-8302C242D467}"/>
               </a:ext>
             </a:extLst>
           </p:cNvPr>
@@ -6603,7 +7675,7 @@
           <p:cNvPr id="3" name="Content Placeholder 2">
             <a:extLst>
               <a:ext uri="{FF2B5EF4-FFF2-40B4-BE49-F238E27FC236}">
-                <a16:creationId xmlns:a16="http://schemas.microsoft.com/office/drawing/2014/main" id="{DD6220EF-BEBD-4D3E-A2ED-205D60B35051}"/>
+                <a16:creationId xmlns:a16="http://schemas.microsoft.com/office/drawing/2014/main" xmlns="" id="{DD6220EF-BEBD-4D3E-A2ED-205D60B35051}"/>
               </a:ext>
             </a:extLst>
           </p:cNvPr>
@@ -6648,6 +7720,13 @@
   <p:clrMapOvr>
     <a:masterClrMapping/>
   </p:clrMapOvr>
+  <p:timing>
+    <p:tnLst>
+      <p:par>
+        <p:cTn id="1" dur="indefinite" restart="never" nodeType="tmRoot"/>
+      </p:par>
+    </p:tnLst>
+  </p:timing>
 </p:sld>
 </file>
 

</xml_diff>

<commit_message>
Implement UI with weather data
</commit_message>
<xml_diff>
--- a/slides/Services_Settings.pptx
+++ b/slides/Services_Settings.pptx
@@ -25,6 +25,7 @@
     <p:sldId id="274" r:id="rId19"/>
     <p:sldId id="275" r:id="rId20"/>
     <p:sldId id="276" r:id="rId21"/>
+    <p:sldId id="277" r:id="rId22"/>
   </p:sldIdLst>
   <p:sldSz cx="12192000" cy="6858000"/>
   <p:notesSz cx="6858000" cy="9144000"/>
@@ -125,7 +126,7 @@
   </p:defaultTextStyle>
   <p:extLst>
     <p:ext uri="{EFAFB233-063F-42B5-8137-9DF3F51BA10A}">
-      <p15:sldGuideLst xmlns="" xmlns:p15="http://schemas.microsoft.com/office/powerpoint/2012/main">
+      <p15:sldGuideLst xmlns:p15="http://schemas.microsoft.com/office/powerpoint/2012/main">
         <p15:guide id="1" orient="horz" pos="2160">
           <p15:clr>
             <a:srgbClr val="A4A3A4"/>
@@ -329,7 +330,7 @@
           <a:p>
             <a:fld id="{1E7C2FAA-919F-4BF2-9DC6-6D7D1753D0B1}" type="datetimeFigureOut">
               <a:rPr lang="en-US" smtClean="0"/>
-              <a:t>6/26/2017</a:t>
+              <a:t>6/27/2017</a:t>
             </a:fld>
             <a:endParaRPr lang="en-US"/>
           </a:p>
@@ -497,7 +498,7 @@
           <a:p>
             <a:fld id="{1E7C2FAA-919F-4BF2-9DC6-6D7D1753D0B1}" type="datetimeFigureOut">
               <a:rPr lang="en-US" smtClean="0"/>
-              <a:t>6/26/2017</a:t>
+              <a:t>6/27/2017</a:t>
             </a:fld>
             <a:endParaRPr lang="en-US"/>
           </a:p>
@@ -675,7 +676,7 @@
           <a:p>
             <a:fld id="{1E7C2FAA-919F-4BF2-9DC6-6D7D1753D0B1}" type="datetimeFigureOut">
               <a:rPr lang="en-US" smtClean="0"/>
-              <a:t>6/26/2017</a:t>
+              <a:t>6/27/2017</a:t>
             </a:fld>
             <a:endParaRPr lang="en-US"/>
           </a:p>
@@ -858,7 +859,7 @@
           <a:p>
             <a:fld id="{1E7C2FAA-919F-4BF2-9DC6-6D7D1753D0B1}" type="datetimeFigureOut">
               <a:rPr lang="en-US" smtClean="0"/>
-              <a:t>6/26/2017</a:t>
+              <a:t>6/27/2017</a:t>
             </a:fld>
             <a:endParaRPr lang="en-US"/>
           </a:p>
@@ -1103,7 +1104,7 @@
           <a:p>
             <a:fld id="{1E7C2FAA-919F-4BF2-9DC6-6D7D1753D0B1}" type="datetimeFigureOut">
               <a:rPr lang="en-US" smtClean="0"/>
-              <a:t>6/26/2017</a:t>
+              <a:t>6/27/2017</a:t>
             </a:fld>
             <a:endParaRPr lang="en-US"/>
           </a:p>
@@ -1397,7 +1398,7 @@
           <a:p>
             <a:fld id="{1E7C2FAA-919F-4BF2-9DC6-6D7D1753D0B1}" type="datetimeFigureOut">
               <a:rPr lang="en-US" smtClean="0"/>
-              <a:t>6/26/2017</a:t>
+              <a:t>6/27/2017</a:t>
             </a:fld>
             <a:endParaRPr lang="en-US"/>
           </a:p>
@@ -1821,7 +1822,7 @@
           <a:p>
             <a:fld id="{1E7C2FAA-919F-4BF2-9DC6-6D7D1753D0B1}" type="datetimeFigureOut">
               <a:rPr lang="en-US" smtClean="0"/>
-              <a:t>6/26/2017</a:t>
+              <a:t>6/27/2017</a:t>
             </a:fld>
             <a:endParaRPr lang="en-US"/>
           </a:p>
@@ -1938,7 +1939,7 @@
           <a:p>
             <a:fld id="{1E7C2FAA-919F-4BF2-9DC6-6D7D1753D0B1}" type="datetimeFigureOut">
               <a:rPr lang="en-US" smtClean="0"/>
-              <a:t>6/26/2017</a:t>
+              <a:t>6/27/2017</a:t>
             </a:fld>
             <a:endParaRPr lang="en-US"/>
           </a:p>
@@ -2033,7 +2034,7 @@
           <a:p>
             <a:fld id="{1E7C2FAA-919F-4BF2-9DC6-6D7D1753D0B1}" type="datetimeFigureOut">
               <a:rPr lang="en-US" smtClean="0"/>
-              <a:t>6/26/2017</a:t>
+              <a:t>6/27/2017</a:t>
             </a:fld>
             <a:endParaRPr lang="en-US"/>
           </a:p>
@@ -2311,7 +2312,7 @@
           <a:p>
             <a:fld id="{1E7C2FAA-919F-4BF2-9DC6-6D7D1753D0B1}" type="datetimeFigureOut">
               <a:rPr lang="en-US" smtClean="0"/>
-              <a:t>6/26/2017</a:t>
+              <a:t>6/27/2017</a:t>
             </a:fld>
             <a:endParaRPr lang="en-US"/>
           </a:p>
@@ -2569,7 +2570,7 @@
           <a:p>
             <a:fld id="{1E7C2FAA-919F-4BF2-9DC6-6D7D1753D0B1}" type="datetimeFigureOut">
               <a:rPr lang="en-US" smtClean="0"/>
-              <a:t>6/26/2017</a:t>
+              <a:t>6/27/2017</a:t>
             </a:fld>
             <a:endParaRPr lang="en-US"/>
           </a:p>
@@ -2826,7 +2827,7 @@
           <a:p>
             <a:fld id="{1E7C2FAA-919F-4BF2-9DC6-6D7D1753D0B1}" type="datetimeFigureOut">
               <a:rPr lang="en-US" smtClean="0"/>
-              <a:t>6/26/2017</a:t>
+              <a:t>6/27/2017</a:t>
             </a:fld>
             <a:endParaRPr lang="en-US"/>
           </a:p>
@@ -3255,13 +3256,6 @@
   <p:clrMapOvr>
     <a:masterClrMapping/>
   </p:clrMapOvr>
-  <p:timing>
-    <p:tnLst>
-      <p:par>
-        <p:cTn id="1" dur="indefinite" restart="never" nodeType="tmRoot"/>
-      </p:par>
-    </p:tnLst>
-  </p:timing>
 </p:sld>
 </file>
 
@@ -3287,7 +3281,7 @@
           <p:cNvPr id="2" name="Title 1">
             <a:extLst>
               <a:ext uri="{FF2B5EF4-FFF2-40B4-BE49-F238E27FC236}">
-                <a16:creationId xmlns="" xmlns:a16="http://schemas.microsoft.com/office/drawing/2014/main" id="{6937279D-980D-4DF7-A4CF-5D668463941A}"/>
+                <a16:creationId xmlns:a16="http://schemas.microsoft.com/office/drawing/2014/main" id="{6937279D-980D-4DF7-A4CF-5D668463941A}"/>
               </a:ext>
             </a:extLst>
           </p:cNvPr>
@@ -3315,7 +3309,7 @@
           <p:cNvPr id="4" name="Content Placeholder 3">
             <a:extLst>
               <a:ext uri="{FF2B5EF4-FFF2-40B4-BE49-F238E27FC236}">
-                <a16:creationId xmlns="" xmlns:a16="http://schemas.microsoft.com/office/drawing/2014/main" id="{6BFCAA9E-8A0D-4756-B208-F45FC9974D2F}"/>
+                <a16:creationId xmlns:a16="http://schemas.microsoft.com/office/drawing/2014/main" id="{6BFCAA9E-8A0D-4756-B208-F45FC9974D2F}"/>
               </a:ext>
             </a:extLst>
           </p:cNvPr>
@@ -3347,7 +3341,7 @@
           <p:cNvPr id="5" name="TextBox 4">
             <a:extLst>
               <a:ext uri="{FF2B5EF4-FFF2-40B4-BE49-F238E27FC236}">
-                <a16:creationId xmlns="" xmlns:a16="http://schemas.microsoft.com/office/drawing/2014/main" id="{36F7D2E2-470E-41D1-BA97-76C0BA03DDF7}"/>
+                <a16:creationId xmlns:a16="http://schemas.microsoft.com/office/drawing/2014/main" id="{36F7D2E2-470E-41D1-BA97-76C0BA03DDF7}"/>
               </a:ext>
             </a:extLst>
           </p:cNvPr>
@@ -3408,7 +3402,7 @@
           <p:cNvPr id="6" name="TextBox 5">
             <a:extLst>
               <a:ext uri="{FF2B5EF4-FFF2-40B4-BE49-F238E27FC236}">
-                <a16:creationId xmlns="" xmlns:a16="http://schemas.microsoft.com/office/drawing/2014/main" id="{766545FC-D4DE-4578-96E6-87A47314220B}"/>
+                <a16:creationId xmlns:a16="http://schemas.microsoft.com/office/drawing/2014/main" id="{766545FC-D4DE-4578-96E6-87A47314220B}"/>
               </a:ext>
             </a:extLst>
           </p:cNvPr>
@@ -3469,7 +3463,7 @@
           <p:cNvPr id="7" name="TextBox 6">
             <a:extLst>
               <a:ext uri="{FF2B5EF4-FFF2-40B4-BE49-F238E27FC236}">
-                <a16:creationId xmlns="" xmlns:a16="http://schemas.microsoft.com/office/drawing/2014/main" id="{1DE4ACB1-692E-418D-B5CD-B8666F49138D}"/>
+                <a16:creationId xmlns:a16="http://schemas.microsoft.com/office/drawing/2014/main" id="{1DE4ACB1-692E-418D-B5CD-B8666F49138D}"/>
               </a:ext>
             </a:extLst>
           </p:cNvPr>
@@ -3517,13 +3511,6 @@
   <p:clrMapOvr>
     <a:masterClrMapping/>
   </p:clrMapOvr>
-  <p:timing>
-    <p:tnLst>
-      <p:par>
-        <p:cTn id="1" dur="indefinite" restart="never" nodeType="tmRoot"/>
-      </p:par>
-    </p:tnLst>
-  </p:timing>
 </p:sld>
 </file>
 
@@ -3549,7 +3536,7 @@
           <p:cNvPr id="2" name="Title 1">
             <a:extLst>
               <a:ext uri="{FF2B5EF4-FFF2-40B4-BE49-F238E27FC236}">
-                <a16:creationId xmlns="" xmlns:a16="http://schemas.microsoft.com/office/drawing/2014/main" id="{C6B3C4AA-0696-42B7-BFBA-88BF681676F3}"/>
+                <a16:creationId xmlns:a16="http://schemas.microsoft.com/office/drawing/2014/main" id="{C6B3C4AA-0696-42B7-BFBA-88BF681676F3}"/>
               </a:ext>
             </a:extLst>
           </p:cNvPr>
@@ -3585,7 +3572,7 @@
           <p:cNvPr id="3" name="Content Placeholder 2">
             <a:extLst>
               <a:ext uri="{FF2B5EF4-FFF2-40B4-BE49-F238E27FC236}">
-                <a16:creationId xmlns="" xmlns:a16="http://schemas.microsoft.com/office/drawing/2014/main" id="{778757EE-D58B-47E0-9CC6-D83D05B46709}"/>
+                <a16:creationId xmlns:a16="http://schemas.microsoft.com/office/drawing/2014/main" id="{778757EE-D58B-47E0-9CC6-D83D05B46709}"/>
               </a:ext>
             </a:extLst>
           </p:cNvPr>
@@ -3618,13 +3605,6 @@
   <p:clrMapOvr>
     <a:masterClrMapping/>
   </p:clrMapOvr>
-  <p:timing>
-    <p:tnLst>
-      <p:par>
-        <p:cTn id="1" dur="indefinite" restart="never" nodeType="tmRoot"/>
-      </p:par>
-    </p:tnLst>
-  </p:timing>
 </p:sld>
 </file>
 
@@ -3650,7 +3630,7 @@
           <p:cNvPr id="2" name="Title 1">
             <a:extLst>
               <a:ext uri="{FF2B5EF4-FFF2-40B4-BE49-F238E27FC236}">
-                <a16:creationId xmlns="" xmlns:a16="http://schemas.microsoft.com/office/drawing/2014/main" id="{9859EDE4-7BA9-4843-B5A2-2D8038774186}"/>
+                <a16:creationId xmlns:a16="http://schemas.microsoft.com/office/drawing/2014/main" id="{9859EDE4-7BA9-4843-B5A2-2D8038774186}"/>
               </a:ext>
             </a:extLst>
           </p:cNvPr>
@@ -3683,7 +3663,7 @@
           <p:cNvPr id="3" name="Content Placeholder 2">
             <a:extLst>
               <a:ext uri="{FF2B5EF4-FFF2-40B4-BE49-F238E27FC236}">
-                <a16:creationId xmlns="" xmlns:a16="http://schemas.microsoft.com/office/drawing/2014/main" id="{3B25B7D2-3AB5-4338-8D2E-F7E8238F1199}"/>
+                <a16:creationId xmlns:a16="http://schemas.microsoft.com/office/drawing/2014/main" id="{3B25B7D2-3AB5-4338-8D2E-F7E8238F1199}"/>
               </a:ext>
             </a:extLst>
           </p:cNvPr>
@@ -3850,13 +3830,6 @@
   <p:clrMapOvr>
     <a:masterClrMapping/>
   </p:clrMapOvr>
-  <p:timing>
-    <p:tnLst>
-      <p:par>
-        <p:cTn id="1" dur="indefinite" restart="never" nodeType="tmRoot"/>
-      </p:par>
-    </p:tnLst>
-  </p:timing>
 </p:sld>
 </file>
 
@@ -3882,7 +3855,7 @@
           <p:cNvPr id="2" name="Title 1">
             <a:extLst>
               <a:ext uri="{FF2B5EF4-FFF2-40B4-BE49-F238E27FC236}">
-                <a16:creationId xmlns="" xmlns:a16="http://schemas.microsoft.com/office/drawing/2014/main" id="{48A4C6BC-8CF2-4ED9-AAD5-B66E8A6EC3CB}"/>
+                <a16:creationId xmlns:a16="http://schemas.microsoft.com/office/drawing/2014/main" id="{48A4C6BC-8CF2-4ED9-AAD5-B66E8A6EC3CB}"/>
               </a:ext>
             </a:extLst>
           </p:cNvPr>
@@ -3910,7 +3883,7 @@
           <p:cNvPr id="3" name="Content Placeholder 2">
             <a:extLst>
               <a:ext uri="{FF2B5EF4-FFF2-40B4-BE49-F238E27FC236}">
-                <a16:creationId xmlns="" xmlns:a16="http://schemas.microsoft.com/office/drawing/2014/main" id="{32F5BCC4-DA59-4E39-8604-419C79E47299}"/>
+                <a16:creationId xmlns:a16="http://schemas.microsoft.com/office/drawing/2014/main" id="{32F5BCC4-DA59-4E39-8604-419C79E47299}"/>
               </a:ext>
             </a:extLst>
           </p:cNvPr>
@@ -4674,7 +4647,7 @@
           <p:cNvPr id="4" name="Arrow: Left 3">
             <a:extLst>
               <a:ext uri="{FF2B5EF4-FFF2-40B4-BE49-F238E27FC236}">
-                <a16:creationId xmlns="" xmlns:a16="http://schemas.microsoft.com/office/drawing/2014/main" id="{3C9BD402-F6F2-4A1F-8930-55022137CFE9}"/>
+                <a16:creationId xmlns:a16="http://schemas.microsoft.com/office/drawing/2014/main" id="{3C9BD402-F6F2-4A1F-8930-55022137CFE9}"/>
               </a:ext>
             </a:extLst>
           </p:cNvPr>
@@ -4882,7 +4855,7 @@
           <p:cNvPr id="2" name="Title 1">
             <a:extLst>
               <a:ext uri="{FF2B5EF4-FFF2-40B4-BE49-F238E27FC236}">
-                <a16:creationId xmlns="" xmlns:a16="http://schemas.microsoft.com/office/drawing/2014/main" id="{C1EB33D9-A64D-43EF-AE74-8A48B19FA639}"/>
+                <a16:creationId xmlns:a16="http://schemas.microsoft.com/office/drawing/2014/main" id="{C1EB33D9-A64D-43EF-AE74-8A48B19FA639}"/>
               </a:ext>
             </a:extLst>
           </p:cNvPr>
@@ -4911,7 +4884,7 @@
           <p:cNvPr id="3" name="Content Placeholder 2">
             <a:extLst>
               <a:ext uri="{FF2B5EF4-FFF2-40B4-BE49-F238E27FC236}">
-                <a16:creationId xmlns="" xmlns:a16="http://schemas.microsoft.com/office/drawing/2014/main" id="{B97C3B36-8A9E-461B-A8C1-3DAD6B0B8DC9}"/>
+                <a16:creationId xmlns:a16="http://schemas.microsoft.com/office/drawing/2014/main" id="{B97C3B36-8A9E-461B-A8C1-3DAD6B0B8DC9}"/>
               </a:ext>
             </a:extLst>
           </p:cNvPr>
@@ -5216,13 +5189,6 @@
   <p:clrMapOvr>
     <a:masterClrMapping/>
   </p:clrMapOvr>
-  <p:timing>
-    <p:tnLst>
-      <p:par>
-        <p:cTn id="1" dur="indefinite" restart="never" nodeType="tmRoot"/>
-      </p:par>
-    </p:tnLst>
-  </p:timing>
 </p:sld>
 </file>
 
@@ -5248,7 +5214,7 @@
           <p:cNvPr id="2" name="Title 1">
             <a:extLst>
               <a:ext uri="{FF2B5EF4-FFF2-40B4-BE49-F238E27FC236}">
-                <a16:creationId xmlns="" xmlns:a16="http://schemas.microsoft.com/office/drawing/2014/main" id="{31590CAC-A7F6-4019-94CF-426A5A30BFBB}"/>
+                <a16:creationId xmlns:a16="http://schemas.microsoft.com/office/drawing/2014/main" id="{31590CAC-A7F6-4019-94CF-426A5A30BFBB}"/>
               </a:ext>
             </a:extLst>
           </p:cNvPr>
@@ -5277,7 +5243,7 @@
           <p:cNvPr id="3" name="Content Placeholder 2">
             <a:extLst>
               <a:ext uri="{FF2B5EF4-FFF2-40B4-BE49-F238E27FC236}">
-                <a16:creationId xmlns="" xmlns:a16="http://schemas.microsoft.com/office/drawing/2014/main" id="{BE7C0233-B831-4B41-AA7E-49605063A8E3}"/>
+                <a16:creationId xmlns:a16="http://schemas.microsoft.com/office/drawing/2014/main" id="{BE7C0233-B831-4B41-AA7E-49605063A8E3}"/>
               </a:ext>
             </a:extLst>
           </p:cNvPr>
@@ -5495,14 +5461,10 @@
             </a:pPr>
             <a:r>
               <a:rPr lang="en-US" sz="2000" dirty="0"/>
-              <a:t>  </a:t>
-            </a:r>
-            <a:r>
-              <a:rPr lang="en-US" sz="2000" dirty="0" smtClean="0"/>
-              <a:t>    </a:t>
-            </a:r>
-            <a:r>
-              <a:rPr lang="en-US" sz="2000" dirty="0" smtClean="0">
+              <a:t>      </a:t>
+            </a:r>
+            <a:r>
+              <a:rPr lang="en-US" sz="2000" dirty="0">
                 <a:solidFill>
                   <a:srgbClr val="0070C0"/>
                 </a:solidFill>
@@ -5608,13 +5570,6 @@
   <p:clrMapOvr>
     <a:masterClrMapping/>
   </p:clrMapOvr>
-  <p:timing>
-    <p:tnLst>
-      <p:par>
-        <p:cTn id="1" dur="indefinite" restart="never" nodeType="tmRoot"/>
-      </p:par>
-    </p:tnLst>
-  </p:timing>
 </p:sld>
 </file>
 
@@ -5651,10 +5606,9 @@
           <a:lstStyle/>
           <a:p>
             <a:r>
-              <a:rPr lang="en-US" dirty="0" smtClean="0"/>
+              <a:rPr lang="en-US" dirty="0"/>
               <a:t>Create Notification</a:t>
             </a:r>
-            <a:endParaRPr lang="en-US" dirty="0"/>
           </a:p>
         </p:txBody>
       </p:sp>
@@ -6041,13 +5995,6 @@
   <p:clrMapOvr>
     <a:masterClrMapping/>
   </p:clrMapOvr>
-  <p:timing>
-    <p:tnLst>
-      <p:par>
-        <p:cTn id="1" dur="indefinite" restart="never" nodeType="tmRoot"/>
-      </p:par>
-    </p:tnLst>
-  </p:timing>
 </p:sld>
 </file>
 
@@ -6084,10 +6031,9 @@
           <a:lstStyle/>
           <a:p>
             <a:r>
-              <a:rPr lang="en-US" dirty="0" smtClean="0"/>
+              <a:rPr lang="en-US" dirty="0"/>
               <a:t>Create Foreground Service </a:t>
             </a:r>
-            <a:endParaRPr lang="en-US" dirty="0"/>
           </a:p>
         </p:txBody>
       </p:sp>
@@ -6117,23 +6063,7 @@
                   <a:srgbClr val="FFC000"/>
                 </a:solidFill>
               </a:rPr>
-              <a:t> </a:t>
-            </a:r>
-            <a:r>
-              <a:rPr lang="en-US" sz="2000" dirty="0" smtClean="0">
-                <a:solidFill>
-                  <a:srgbClr val="FFC000"/>
-                </a:solidFill>
-              </a:rPr>
-              <a:t>   @</a:t>
-            </a:r>
-            <a:r>
-              <a:rPr lang="en-US" sz="2000" dirty="0">
-                <a:solidFill>
-                  <a:srgbClr val="FFC000"/>
-                </a:solidFill>
-              </a:rPr>
-              <a:t>Override</a:t>
+              <a:t>    @Override</a:t>
             </a:r>
           </a:p>
           <a:p>
@@ -6278,21 +6208,16 @@
             </a:r>
             <a:r>
               <a:rPr lang="en-US" sz="2000" dirty="0"/>
-              <a:t>(NOTIFICATION_ID</a:t>
-            </a:r>
-            <a:r>
-              <a:rPr lang="en-US" sz="2000" dirty="0" smtClean="0"/>
-              <a:t>, </a:t>
-            </a:r>
-            <a:r>
-              <a:rPr lang="en-US" sz="2000" dirty="0" err="1" smtClean="0"/>
+              <a:t>(NOTIFICATION_ID, </a:t>
+            </a:r>
+            <a:r>
+              <a:rPr lang="en-US" sz="2000" dirty="0" err="1"/>
               <a:t>getNotification</a:t>
             </a:r>
             <a:r>
-              <a:rPr lang="en-US" sz="2000" dirty="0" smtClean="0"/>
+              <a:rPr lang="en-US" sz="2000" dirty="0"/>
               <a:t>()); </a:t>
             </a:r>
-            <a:endParaRPr lang="en-US" sz="2000" dirty="0"/>
           </a:p>
           <a:p>
             <a:pPr marL="0" indent="0">
@@ -6593,10 +6518,9 @@
           <a:lstStyle/>
           <a:p>
             <a:r>
-              <a:rPr lang="en-US" dirty="0" smtClean="0"/>
+              <a:rPr lang="en-US" dirty="0"/>
               <a:t>Broadcast</a:t>
             </a:r>
-            <a:endParaRPr lang="en-US" dirty="0"/>
           </a:p>
         </p:txBody>
       </p:sp>
@@ -6619,22 +6543,9 @@
               <a:buNone/>
             </a:pPr>
             <a:r>
-              <a:rPr lang="en-US" dirty="0" smtClean="0"/>
-              <a:t>Method to send </a:t>
-            </a:r>
-            <a:r>
-              <a:rPr lang="en-US" dirty="0"/>
-              <a:t>or receive </a:t>
-            </a:r>
-            <a:r>
-              <a:rPr lang="en-US" dirty="0" smtClean="0"/>
-              <a:t>messages </a:t>
-            </a:r>
-            <a:r>
-              <a:rPr lang="en-US" dirty="0"/>
-              <a:t>from the Android system and other Android apps, similar to the publish-subscribe design pattern.</a:t>
-            </a:r>
-            <a:endParaRPr lang="en-US" dirty="0"/>
+              <a:rPr lang="en-US" dirty="0"/>
+              <a:t>Method to send or receive messages from the Android system and other Android apps, similar to the publish-subscribe design pattern.</a:t>
+            </a:r>
           </a:p>
         </p:txBody>
       </p:sp>
@@ -6684,10 +6595,9 @@
           <a:lstStyle/>
           <a:p>
             <a:r>
-              <a:rPr lang="en-US" dirty="0" smtClean="0"/>
+              <a:rPr lang="en-US" dirty="0"/>
               <a:t>Send Broadcast</a:t>
             </a:r>
-            <a:endParaRPr lang="en-US" dirty="0"/>
           </a:p>
         </p:txBody>
       </p:sp>
@@ -6712,31 +6622,19 @@
               <a:buNone/>
             </a:pPr>
             <a:r>
-              <a:rPr lang="en-US" sz="2000" dirty="0" smtClean="0">
+              <a:rPr lang="en-US" sz="2000" dirty="0">
                 <a:solidFill>
                   <a:srgbClr val="7030A0"/>
                 </a:solidFill>
               </a:rPr>
-              <a:t>public </a:t>
-            </a:r>
-            <a:r>
-              <a:rPr lang="en-US" sz="2000" dirty="0">
-                <a:solidFill>
-                  <a:srgbClr val="7030A0"/>
-                </a:solidFill>
-              </a:rPr>
-              <a:t>static </a:t>
+              <a:t>public static </a:t>
             </a:r>
             <a:r>
               <a:rPr lang="en-US" sz="2000" dirty="0"/>
-              <a:t>String TEMPERATURE_SEND_EVENT = </a:t>
-            </a:r>
-            <a:r>
-              <a:rPr lang="en-US" sz="2000" dirty="0" smtClean="0"/>
-              <a:t>"</a:t>
-            </a:r>
-            <a:r>
-              <a:rPr lang="en-US" sz="2000" dirty="0" err="1" smtClean="0"/>
+              <a:t>String TEMPERATURE_SEND_EVENT = "</a:t>
+            </a:r>
+            <a:r>
+              <a:rPr lang="en-US" sz="2000" dirty="0" err="1"/>
               <a:t>blueskies.TEMPERATURE_SEND_EVENT</a:t>
             </a:r>
             <a:r>
@@ -6749,38 +6647,25 @@
               <a:buNone/>
             </a:pPr>
             <a:r>
-              <a:rPr lang="en-US" sz="2000" dirty="0" smtClean="0">
+              <a:rPr lang="en-US" sz="2000" dirty="0">
                 <a:solidFill>
                   <a:srgbClr val="7030A0"/>
                 </a:solidFill>
               </a:rPr>
-              <a:t>public </a:t>
-            </a:r>
-            <a:r>
-              <a:rPr lang="en-US" sz="2000" dirty="0">
-                <a:solidFill>
-                  <a:srgbClr val="7030A0"/>
-                </a:solidFill>
-              </a:rPr>
-              <a:t>static </a:t>
+              <a:t>public static </a:t>
             </a:r>
             <a:r>
               <a:rPr lang="en-US" sz="2000" dirty="0"/>
-              <a:t>String TEMPERATURE_KEY = </a:t>
-            </a:r>
-            <a:r>
-              <a:rPr lang="en-US" sz="2000" dirty="0" smtClean="0"/>
-              <a:t>"</a:t>
-            </a:r>
-            <a:r>
-              <a:rPr lang="en-US" sz="2000" dirty="0" err="1" smtClean="0"/>
+              <a:t>String TEMPERATURE_KEY = "</a:t>
+            </a:r>
+            <a:r>
+              <a:rPr lang="en-US" sz="2000" dirty="0" err="1"/>
               <a:t>blueskies.TEMPERATURE_KEY</a:t>
             </a:r>
             <a:r>
               <a:rPr lang="en-US" sz="2000" dirty="0"/>
               <a:t>"; </a:t>
             </a:r>
-            <a:endParaRPr lang="en-US" sz="2000" dirty="0" smtClean="0"/>
           </a:p>
           <a:p>
             <a:pPr marL="0" indent="0">
@@ -6797,20 +6682,12 @@
               <a:buNone/>
             </a:pPr>
             <a:r>
-              <a:rPr lang="en-US" sz="2000" dirty="0" smtClean="0">
+              <a:rPr lang="en-US" sz="2000" dirty="0">
                 <a:solidFill>
                   <a:srgbClr val="7030A0"/>
                 </a:solidFill>
               </a:rPr>
-              <a:t>private </a:t>
-            </a:r>
-            <a:r>
-              <a:rPr lang="en-US" sz="2000" dirty="0">
-                <a:solidFill>
-                  <a:srgbClr val="7030A0"/>
-                </a:solidFill>
-              </a:rPr>
-              <a:t>void </a:t>
+              <a:t>private void </a:t>
             </a:r>
             <a:r>
               <a:rPr lang="en-US" sz="2000" dirty="0" err="1"/>
@@ -6876,24 +6753,12 @@
               <a:t>        </a:t>
             </a:r>
             <a:r>
-              <a:rPr lang="en-US" sz="2000" dirty="0" err="1" smtClean="0"/>
+              <a:rPr lang="en-US" sz="2000" dirty="0" err="1"/>
               <a:t>sendEventIntent.putExtra</a:t>
             </a:r>
             <a:r>
-              <a:rPr lang="en-US" sz="2000" dirty="0" smtClean="0"/>
-              <a:t>(</a:t>
-            </a:r>
-            <a:r>
               <a:rPr lang="en-US" sz="2000" dirty="0"/>
-              <a:t>TEMPERATURE_KEY </a:t>
-            </a:r>
-            <a:r>
-              <a:rPr lang="en-US" sz="2000" dirty="0" smtClean="0"/>
-              <a:t>, temperature</a:t>
-            </a:r>
-            <a:r>
-              <a:rPr lang="en-US" sz="2000" dirty="0"/>
-              <a:t>);</a:t>
+              <a:t>(TEMPERATURE_KEY , temperature);</a:t>
             </a:r>
           </a:p>
           <a:p>
@@ -6942,13 +6807,6 @@
   <p:clrMapOvr>
     <a:masterClrMapping/>
   </p:clrMapOvr>
-  <p:timing>
-    <p:tnLst>
-      <p:par>
-        <p:cTn id="1" dur="indefinite" restart="never" nodeType="tmRoot"/>
-      </p:par>
-    </p:tnLst>
-  </p:timing>
 </p:sld>
 </file>
 
@@ -6974,7 +6832,7 @@
           <p:cNvPr id="3" name="Content Placeholder 2">
             <a:extLst>
               <a:ext uri="{FF2B5EF4-FFF2-40B4-BE49-F238E27FC236}">
-                <a16:creationId xmlns="" xmlns:a16="http://schemas.microsoft.com/office/drawing/2014/main" id="{08E703A8-D08A-40C4-9D66-12F2C301B63B}"/>
+                <a16:creationId xmlns:a16="http://schemas.microsoft.com/office/drawing/2014/main" id="{08E703A8-D08A-40C4-9D66-12F2C301B63B}"/>
               </a:ext>
             </a:extLst>
           </p:cNvPr>
@@ -7022,13 +6880,6 @@
   <p:clrMapOvr>
     <a:masterClrMapping/>
   </p:clrMapOvr>
-  <p:timing>
-    <p:tnLst>
-      <p:par>
-        <p:cTn id="1" dur="indefinite" restart="never" nodeType="tmRoot"/>
-      </p:par>
-    </p:tnLst>
-  </p:timing>
 </p:sld>
 </file>
 
@@ -7065,10 +6916,9 @@
           <a:lstStyle/>
           <a:p>
             <a:r>
-              <a:rPr lang="en-US" dirty="0" smtClean="0"/>
+              <a:rPr lang="en-US" dirty="0"/>
               <a:t>Receive Broadcast</a:t>
             </a:r>
-            <a:endParaRPr lang="en-US" dirty="0"/>
           </a:p>
         </p:txBody>
       </p:sp>
@@ -7098,11 +6948,11 @@
               <a:buNone/>
             </a:pPr>
             <a:r>
-              <a:rPr lang="en-US" sz="6800" dirty="0" smtClean="0"/>
+              <a:rPr lang="en-US" sz="6800" dirty="0"/>
               <a:t>    </a:t>
             </a:r>
             <a:r>
-              <a:rPr lang="en-US" sz="6800" dirty="0" smtClean="0">
+              <a:rPr lang="en-US" sz="6800" dirty="0">
                 <a:solidFill>
                   <a:srgbClr val="7030A0"/>
                 </a:solidFill>
@@ -7110,7 +6960,7 @@
               <a:t>private</a:t>
             </a:r>
             <a:r>
-              <a:rPr lang="en-US" sz="6800" dirty="0" smtClean="0"/>
+              <a:rPr lang="en-US" sz="6800" dirty="0"/>
               <a:t> </a:t>
             </a:r>
             <a:r>
@@ -7255,23 +7105,15 @@
             </a:pPr>
             <a:r>
               <a:rPr lang="en-US" sz="6800" dirty="0"/>
-              <a:t>            </a:t>
-            </a:r>
-            <a:r>
-              <a:rPr lang="en-US" sz="6800" dirty="0" smtClean="0"/>
-              <a:t>    </a:t>
-            </a:r>
-            <a:r>
-              <a:rPr lang="en-US" sz="6800" dirty="0" err="1" smtClean="0"/>
+              <a:t>                </a:t>
+            </a:r>
+            <a:r>
+              <a:rPr lang="en-US" sz="6800" dirty="0" err="1"/>
               <a:t>Toast.makeText</a:t>
             </a:r>
             <a:r>
-              <a:rPr lang="en-US" sz="6800" dirty="0" smtClean="0"/>
-              <a:t>(context</a:t>
-            </a:r>
-            <a:r>
               <a:rPr lang="en-US" sz="6800" dirty="0"/>
-              <a:t>, "Broadcast Received", </a:t>
+              <a:t>(context, "Broadcast Received", </a:t>
             </a:r>
             <a:r>
               <a:rPr lang="en-US" sz="6800" dirty="0" err="1"/>
@@ -7297,45 +7139,24 @@
             </a:pPr>
             <a:r>
               <a:rPr lang="en-US" sz="6800" dirty="0"/>
+              <a:t>    };	</a:t>
+            </a:r>
+          </a:p>
+          <a:p>
+            <a:pPr marL="0" indent="0">
+              <a:buNone/>
+            </a:pPr>
+            <a:r>
+              <a:rPr lang="en-US" sz="6800" dirty="0"/>
               <a:t>    </a:t>
             </a:r>
             <a:r>
-              <a:rPr lang="en-US" sz="6800" dirty="0" smtClean="0"/>
-              <a:t>};</a:t>
-            </a:r>
-            <a:r>
-              <a:rPr lang="en-US" sz="6800" dirty="0"/>
-              <a:t>	</a:t>
-            </a:r>
-            <a:endParaRPr lang="en-US" sz="6800" dirty="0" smtClean="0"/>
-          </a:p>
-          <a:p>
-            <a:pPr marL="0" indent="0">
-              <a:buNone/>
-            </a:pPr>
-            <a:r>
-              <a:rPr lang="en-US" sz="6800" dirty="0"/>
-              <a:t> </a:t>
-            </a:r>
-            <a:r>
-              <a:rPr lang="en-US" sz="6800" dirty="0" smtClean="0"/>
-              <a:t>   </a:t>
-            </a:r>
-            <a:r>
-              <a:rPr lang="en-US" sz="6800" dirty="0" smtClean="0">
+              <a:rPr lang="en-US" sz="6800" dirty="0">
                 <a:solidFill>
                   <a:srgbClr val="FFC000"/>
                 </a:solidFill>
               </a:rPr>
-              <a:t>@</a:t>
-            </a:r>
-            <a:r>
-              <a:rPr lang="en-US" sz="6800" dirty="0">
-                <a:solidFill>
-                  <a:srgbClr val="FFC000"/>
-                </a:solidFill>
-              </a:rPr>
-              <a:t>Override</a:t>
+              <a:t>@Override</a:t>
             </a:r>
           </a:p>
           <a:p>
@@ -7393,15 +7214,15 @@
               <a:t>        </a:t>
             </a:r>
             <a:r>
-              <a:rPr lang="en-US" sz="6800" dirty="0" err="1" smtClean="0"/>
+              <a:rPr lang="en-US" sz="6800" dirty="0" err="1"/>
               <a:t>context.registerReceiver</a:t>
             </a:r>
             <a:r>
-              <a:rPr lang="en-US" sz="6800" dirty="0" smtClean="0"/>
+              <a:rPr lang="en-US" sz="6800" dirty="0"/>
               <a:t>(</a:t>
             </a:r>
             <a:r>
-              <a:rPr lang="en-US" sz="6800" dirty="0" err="1" smtClean="0"/>
+              <a:rPr lang="en-US" sz="6800" dirty="0" err="1"/>
               <a:t>temperatureReceiver</a:t>
             </a:r>
             <a:r>
@@ -7423,23 +7244,19 @@
             </a:pPr>
             <a:r>
               <a:rPr lang="en-US" sz="6800" dirty="0"/>
+              <a:t>    }</a:t>
+            </a:r>
+          </a:p>
+          <a:p>
+            <a:pPr marL="0" indent="0">
+              <a:buNone/>
+            </a:pPr>
+            <a:r>
+              <a:rPr lang="en-US" sz="6800" dirty="0"/>
               <a:t>    </a:t>
             </a:r>
             <a:r>
-              <a:rPr lang="en-US" sz="6800" dirty="0" smtClean="0"/>
-              <a:t>}</a:t>
-            </a:r>
-          </a:p>
-          <a:p>
-            <a:pPr marL="0" indent="0">
-              <a:buNone/>
-            </a:pPr>
-            <a:r>
-              <a:rPr lang="en-US" sz="6800" dirty="0" smtClean="0"/>
-              <a:t>    </a:t>
-            </a:r>
-            <a:r>
-              <a:rPr lang="en-US" sz="6800" dirty="0" smtClean="0">
+              <a:rPr lang="en-US" sz="6800" dirty="0">
                 <a:solidFill>
                   <a:srgbClr val="FFC000"/>
                 </a:solidFill>
@@ -7452,7 +7269,7 @@
               <a:buNone/>
             </a:pPr>
             <a:r>
-              <a:rPr lang="en-US" sz="6800" dirty="0" smtClean="0"/>
+              <a:rPr lang="en-US" sz="6800" dirty="0"/>
               <a:t>    </a:t>
             </a:r>
             <a:r>
@@ -7498,15 +7315,15 @@
               <a:t>        </a:t>
             </a:r>
             <a:r>
-              <a:rPr lang="en-US" sz="6800" dirty="0" err="1" smtClean="0"/>
+              <a:rPr lang="en-US" sz="6800" dirty="0" err="1"/>
               <a:t>context.unregisterReceiver</a:t>
             </a:r>
             <a:r>
-              <a:rPr lang="en-US" sz="6800" dirty="0" smtClean="0"/>
+              <a:rPr lang="en-US" sz="6800" dirty="0"/>
               <a:t>(</a:t>
             </a:r>
             <a:r>
-              <a:rPr lang="en-US" sz="6800" dirty="0" err="1" smtClean="0"/>
+              <a:rPr lang="en-US" sz="6800" dirty="0" err="1"/>
               <a:t>temperatureReceiver</a:t>
             </a:r>
             <a:r>
@@ -7541,13 +7358,158 @@
   <p:clrMapOvr>
     <a:masterClrMapping/>
   </p:clrMapOvr>
-  <p:timing>
-    <p:tnLst>
-      <p:par>
-        <p:cTn id="1" dur="indefinite" restart="never" nodeType="tmRoot"/>
-      </p:par>
-    </p:tnLst>
-  </p:timing>
+</p:sld>
+</file>
+
+<file path=ppt/slides/slide21.xml><?xml version="1.0" encoding="utf-8"?>
+<p:sld xmlns:a="http://schemas.openxmlformats.org/drawingml/2006/main" xmlns:r="http://schemas.openxmlformats.org/officeDocument/2006/relationships" xmlns:p="http://schemas.openxmlformats.org/presentationml/2006/main">
+  <p:cSld>
+    <p:spTree>
+      <p:nvGrpSpPr>
+        <p:cNvPr id="1" name=""/>
+        <p:cNvGrpSpPr/>
+        <p:nvPr/>
+      </p:nvGrpSpPr>
+      <p:grpSpPr>
+        <a:xfrm>
+          <a:off x="0" y="0"/>
+          <a:ext cx="0" cy="0"/>
+          <a:chOff x="0" y="0"/>
+          <a:chExt cx="0" cy="0"/>
+        </a:xfrm>
+      </p:grpSpPr>
+      <p:sp>
+        <p:nvSpPr>
+          <p:cNvPr id="2" name="Title 1">
+            <a:extLst>
+              <a:ext uri="{FF2B5EF4-FFF2-40B4-BE49-F238E27FC236}">
+                <a16:creationId xmlns:a16="http://schemas.microsoft.com/office/drawing/2014/main" id="{46414A91-04B2-46DD-90EB-58E4CF65AE03}"/>
+              </a:ext>
+            </a:extLst>
+          </p:cNvPr>
+          <p:cNvSpPr>
+            <a:spLocks noGrp="1"/>
+          </p:cNvSpPr>
+          <p:nvPr>
+            <p:ph type="title"/>
+          </p:nvPr>
+        </p:nvSpPr>
+        <p:spPr/>
+        <p:txBody>
+          <a:bodyPr/>
+          <a:lstStyle/>
+          <a:p>
+            <a:r>
+              <a:rPr lang="en-US" dirty="0"/>
+              <a:t>Permission</a:t>
+            </a:r>
+          </a:p>
+        </p:txBody>
+      </p:sp>
+      <p:sp>
+        <p:nvSpPr>
+          <p:cNvPr id="3" name="Content Placeholder 2">
+            <a:extLst>
+              <a:ext uri="{FF2B5EF4-FFF2-40B4-BE49-F238E27FC236}">
+                <a16:creationId xmlns:a16="http://schemas.microsoft.com/office/drawing/2014/main" id="{9E42BFAB-4631-442F-84FD-355BC5D32BF7}"/>
+              </a:ext>
+            </a:extLst>
+          </p:cNvPr>
+          <p:cNvSpPr>
+            <a:spLocks noGrp="1"/>
+          </p:cNvSpPr>
+          <p:nvPr>
+            <p:ph idx="1"/>
+          </p:nvPr>
+        </p:nvSpPr>
+        <p:spPr/>
+        <p:txBody>
+          <a:bodyPr>
+            <a:normAutofit/>
+          </a:bodyPr>
+          <a:lstStyle/>
+          <a:p>
+            <a:pPr marL="0" indent="0">
+              <a:buNone/>
+            </a:pPr>
+            <a:r>
+              <a:rPr lang="en-US" sz="3200" dirty="0"/>
+              <a:t>Declares a security permission that can be used to limit access to specific components or features of this or other applications</a:t>
+            </a:r>
+            <a:endParaRPr lang="fr-FR" sz="3200" dirty="0"/>
+          </a:p>
+          <a:p>
+            <a:pPr marL="0" indent="0">
+              <a:buNone/>
+            </a:pPr>
+            <a:endParaRPr lang="fr-FR" sz="2000" dirty="0"/>
+          </a:p>
+          <a:p>
+            <a:pPr marL="0" indent="0">
+              <a:buNone/>
+            </a:pPr>
+            <a:r>
+              <a:rPr lang="fr-FR" sz="3200" dirty="0">
+                <a:solidFill>
+                  <a:srgbClr val="0070C0"/>
+                </a:solidFill>
+              </a:rPr>
+              <a:t>&lt;uses-permission </a:t>
+            </a:r>
+            <a:r>
+              <a:rPr lang="fr-FR" sz="3200" dirty="0" err="1"/>
+              <a:t>android:name</a:t>
+            </a:r>
+            <a:r>
+              <a:rPr lang="fr-FR" sz="3200" dirty="0">
+                <a:solidFill>
+                  <a:srgbClr val="7030A0"/>
+                </a:solidFill>
+              </a:rPr>
+              <a:t>="</a:t>
+            </a:r>
+            <a:r>
+              <a:rPr lang="fr-FR" sz="3200" dirty="0" err="1">
+                <a:solidFill>
+                  <a:srgbClr val="7030A0"/>
+                </a:solidFill>
+              </a:rPr>
+              <a:t>android.permission.INTERNET</a:t>
+            </a:r>
+            <a:r>
+              <a:rPr lang="fr-FR" sz="3200" dirty="0">
+                <a:solidFill>
+                  <a:srgbClr val="7030A0"/>
+                </a:solidFill>
+              </a:rPr>
+              <a:t>" </a:t>
+            </a:r>
+            <a:r>
+              <a:rPr lang="fr-FR" sz="3200" dirty="0">
+                <a:solidFill>
+                  <a:srgbClr val="0070C0"/>
+                </a:solidFill>
+              </a:rPr>
+              <a:t>/&gt; </a:t>
+            </a:r>
+            <a:endParaRPr lang="en-US" sz="3200" dirty="0">
+              <a:solidFill>
+                <a:srgbClr val="0070C0"/>
+              </a:solidFill>
+            </a:endParaRPr>
+          </a:p>
+        </p:txBody>
+      </p:sp>
+    </p:spTree>
+    <p:extLst>
+      <p:ext uri="{BB962C8B-B14F-4D97-AF65-F5344CB8AC3E}">
+        <p14:creationId xmlns:p14="http://schemas.microsoft.com/office/powerpoint/2010/main" val="1207010250"/>
+      </p:ext>
+    </p:extLst>
+  </p:cSld>
+  <p:clrMapOvr>
+    <a:masterClrMapping/>
+  </p:clrMapOvr>
 </p:sld>
 </file>
 
@@ -7573,7 +7535,7 @@
           <p:cNvPr id="2" name="Title 1">
             <a:extLst>
               <a:ext uri="{FF2B5EF4-FFF2-40B4-BE49-F238E27FC236}">
-                <a16:creationId xmlns="" xmlns:a16="http://schemas.microsoft.com/office/drawing/2014/main" id="{00267D90-8F6E-410E-B140-E7EF5822F082}"/>
+                <a16:creationId xmlns:a16="http://schemas.microsoft.com/office/drawing/2014/main" id="{00267D90-8F6E-410E-B140-E7EF5822F082}"/>
               </a:ext>
             </a:extLst>
           </p:cNvPr>
@@ -7601,7 +7563,7 @@
           <p:cNvPr id="3" name="Content Placeholder 2">
             <a:extLst>
               <a:ext uri="{FF2B5EF4-FFF2-40B4-BE49-F238E27FC236}">
-                <a16:creationId xmlns="" xmlns:a16="http://schemas.microsoft.com/office/drawing/2014/main" id="{E057E826-053F-4E30-BCC2-D1A5F70A181C}"/>
+                <a16:creationId xmlns:a16="http://schemas.microsoft.com/office/drawing/2014/main" id="{E057E826-053F-4E30-BCC2-D1A5F70A181C}"/>
               </a:ext>
             </a:extLst>
           </p:cNvPr>
@@ -7642,13 +7604,6 @@
   <p:clrMapOvr>
     <a:masterClrMapping/>
   </p:clrMapOvr>
-  <p:timing>
-    <p:tnLst>
-      <p:par>
-        <p:cTn id="1" dur="indefinite" restart="never" nodeType="tmRoot"/>
-      </p:par>
-    </p:tnLst>
-  </p:timing>
 </p:sld>
 </file>
 
@@ -7674,7 +7629,7 @@
           <p:cNvPr id="2" name="Title 1">
             <a:extLst>
               <a:ext uri="{FF2B5EF4-FFF2-40B4-BE49-F238E27FC236}">
-                <a16:creationId xmlns="" xmlns:a16="http://schemas.microsoft.com/office/drawing/2014/main" id="{2D5F6D41-FD34-48A1-99E7-E66A69FEAC8B}"/>
+                <a16:creationId xmlns:a16="http://schemas.microsoft.com/office/drawing/2014/main" id="{2D5F6D41-FD34-48A1-99E7-E66A69FEAC8B}"/>
               </a:ext>
             </a:extLst>
           </p:cNvPr>
@@ -7702,7 +7657,7 @@
           <p:cNvPr id="3" name="Content Placeholder 2">
             <a:extLst>
               <a:ext uri="{FF2B5EF4-FFF2-40B4-BE49-F238E27FC236}">
-                <a16:creationId xmlns="" xmlns:a16="http://schemas.microsoft.com/office/drawing/2014/main" id="{D5CE508C-0569-4909-BCA7-53FA1A5D6142}"/>
+                <a16:creationId xmlns:a16="http://schemas.microsoft.com/office/drawing/2014/main" id="{D5CE508C-0569-4909-BCA7-53FA1A5D6142}"/>
               </a:ext>
             </a:extLst>
           </p:cNvPr>
@@ -7766,13 +7721,6 @@
   <p:clrMapOvr>
     <a:masterClrMapping/>
   </p:clrMapOvr>
-  <p:timing>
-    <p:tnLst>
-      <p:par>
-        <p:cTn id="1" dur="indefinite" restart="never" nodeType="tmRoot"/>
-      </p:par>
-    </p:tnLst>
-  </p:timing>
 </p:sld>
 </file>
 
@@ -7798,7 +7746,7 @@
           <p:cNvPr id="2" name="Title 1">
             <a:extLst>
               <a:ext uri="{FF2B5EF4-FFF2-40B4-BE49-F238E27FC236}">
-                <a16:creationId xmlns="" xmlns:a16="http://schemas.microsoft.com/office/drawing/2014/main" id="{B3D4D9FF-35FA-4524-8518-556DF2C86A7F}"/>
+                <a16:creationId xmlns:a16="http://schemas.microsoft.com/office/drawing/2014/main" id="{B3D4D9FF-35FA-4524-8518-556DF2C86A7F}"/>
               </a:ext>
             </a:extLst>
           </p:cNvPr>
@@ -7827,7 +7775,7 @@
           <p:cNvPr id="3" name="Content Placeholder 2">
             <a:extLst>
               <a:ext uri="{FF2B5EF4-FFF2-40B4-BE49-F238E27FC236}">
-                <a16:creationId xmlns="" xmlns:a16="http://schemas.microsoft.com/office/drawing/2014/main" id="{E3DAD111-70F8-4E42-977B-F57EE75EFFD1}"/>
+                <a16:creationId xmlns:a16="http://schemas.microsoft.com/office/drawing/2014/main" id="{E3DAD111-70F8-4E42-977B-F57EE75EFFD1}"/>
               </a:ext>
             </a:extLst>
           </p:cNvPr>
@@ -7889,13 +7837,6 @@
   <p:clrMapOvr>
     <a:masterClrMapping/>
   </p:clrMapOvr>
-  <p:timing>
-    <p:tnLst>
-      <p:par>
-        <p:cTn id="1" dur="indefinite" restart="never" nodeType="tmRoot"/>
-      </p:par>
-    </p:tnLst>
-  </p:timing>
 </p:sld>
 </file>
 
@@ -7921,7 +7862,7 @@
           <p:cNvPr id="2" name="Title 1">
             <a:extLst>
               <a:ext uri="{FF2B5EF4-FFF2-40B4-BE49-F238E27FC236}">
-                <a16:creationId xmlns="" xmlns:a16="http://schemas.microsoft.com/office/drawing/2014/main" id="{6937279D-980D-4DF7-A4CF-5D668463941A}"/>
+                <a16:creationId xmlns:a16="http://schemas.microsoft.com/office/drawing/2014/main" id="{6937279D-980D-4DF7-A4CF-5D668463941A}"/>
               </a:ext>
             </a:extLst>
           </p:cNvPr>
@@ -7949,7 +7890,7 @@
           <p:cNvPr id="4" name="Content Placeholder 3">
             <a:extLst>
               <a:ext uri="{FF2B5EF4-FFF2-40B4-BE49-F238E27FC236}">
-                <a16:creationId xmlns="" xmlns:a16="http://schemas.microsoft.com/office/drawing/2014/main" id="{6BFCAA9E-8A0D-4756-B208-F45FC9974D2F}"/>
+                <a16:creationId xmlns:a16="http://schemas.microsoft.com/office/drawing/2014/main" id="{6BFCAA9E-8A0D-4756-B208-F45FC9974D2F}"/>
               </a:ext>
             </a:extLst>
           </p:cNvPr>
@@ -7981,7 +7922,7 @@
           <p:cNvPr id="5" name="TextBox 4">
             <a:extLst>
               <a:ext uri="{FF2B5EF4-FFF2-40B4-BE49-F238E27FC236}">
-                <a16:creationId xmlns="" xmlns:a16="http://schemas.microsoft.com/office/drawing/2014/main" id="{36F7D2E2-470E-41D1-BA97-76C0BA03DDF7}"/>
+                <a16:creationId xmlns:a16="http://schemas.microsoft.com/office/drawing/2014/main" id="{36F7D2E2-470E-41D1-BA97-76C0BA03DDF7}"/>
               </a:ext>
             </a:extLst>
           </p:cNvPr>
@@ -8024,7 +7965,7 @@
           <p:cNvPr id="6" name="TextBox 5">
             <a:extLst>
               <a:ext uri="{FF2B5EF4-FFF2-40B4-BE49-F238E27FC236}">
-                <a16:creationId xmlns="" xmlns:a16="http://schemas.microsoft.com/office/drawing/2014/main" id="{766545FC-D4DE-4578-96E6-87A47314220B}"/>
+                <a16:creationId xmlns:a16="http://schemas.microsoft.com/office/drawing/2014/main" id="{766545FC-D4DE-4578-96E6-87A47314220B}"/>
               </a:ext>
             </a:extLst>
           </p:cNvPr>
@@ -8085,7 +8026,7 @@
           <p:cNvPr id="7" name="TextBox 6">
             <a:extLst>
               <a:ext uri="{FF2B5EF4-FFF2-40B4-BE49-F238E27FC236}">
-                <a16:creationId xmlns="" xmlns:a16="http://schemas.microsoft.com/office/drawing/2014/main" id="{1DE4ACB1-692E-418D-B5CD-B8666F49138D}"/>
+                <a16:creationId xmlns:a16="http://schemas.microsoft.com/office/drawing/2014/main" id="{1DE4ACB1-692E-418D-B5CD-B8666F49138D}"/>
               </a:ext>
             </a:extLst>
           </p:cNvPr>
@@ -8151,13 +8092,6 @@
   <p:clrMapOvr>
     <a:masterClrMapping/>
   </p:clrMapOvr>
-  <p:timing>
-    <p:tnLst>
-      <p:par>
-        <p:cTn id="1" dur="indefinite" restart="never" nodeType="tmRoot"/>
-      </p:par>
-    </p:tnLst>
-  </p:timing>
 </p:sld>
 </file>
 
@@ -8183,7 +8117,7 @@
           <p:cNvPr id="2" name="Title 1">
             <a:extLst>
               <a:ext uri="{FF2B5EF4-FFF2-40B4-BE49-F238E27FC236}">
-                <a16:creationId xmlns="" xmlns:a16="http://schemas.microsoft.com/office/drawing/2014/main" id="{8272E683-F26E-4E30-B478-70247A792673}"/>
+                <a16:creationId xmlns:a16="http://schemas.microsoft.com/office/drawing/2014/main" id="{8272E683-F26E-4E30-B478-70247A792673}"/>
               </a:ext>
             </a:extLst>
           </p:cNvPr>
@@ -8219,7 +8153,7 @@
           <p:cNvPr id="3" name="Content Placeholder 2">
             <a:extLst>
               <a:ext uri="{FF2B5EF4-FFF2-40B4-BE49-F238E27FC236}">
-                <a16:creationId xmlns="" xmlns:a16="http://schemas.microsoft.com/office/drawing/2014/main" id="{35A8704B-94B0-4A63-8837-BF588A085298}"/>
+                <a16:creationId xmlns:a16="http://schemas.microsoft.com/office/drawing/2014/main" id="{35A8704B-94B0-4A63-8837-BF588A085298}"/>
               </a:ext>
             </a:extLst>
           </p:cNvPr>
@@ -8258,13 +8192,6 @@
   <p:clrMapOvr>
     <a:masterClrMapping/>
   </p:clrMapOvr>
-  <p:timing>
-    <p:tnLst>
-      <p:par>
-        <p:cTn id="1" dur="indefinite" restart="never" nodeType="tmRoot"/>
-      </p:par>
-    </p:tnLst>
-  </p:timing>
 </p:sld>
 </file>
 
@@ -8290,7 +8217,7 @@
           <p:cNvPr id="2" name="Title 1">
             <a:extLst>
               <a:ext uri="{FF2B5EF4-FFF2-40B4-BE49-F238E27FC236}">
-                <a16:creationId xmlns="" xmlns:a16="http://schemas.microsoft.com/office/drawing/2014/main" id="{6937279D-980D-4DF7-A4CF-5D668463941A}"/>
+                <a16:creationId xmlns:a16="http://schemas.microsoft.com/office/drawing/2014/main" id="{6937279D-980D-4DF7-A4CF-5D668463941A}"/>
               </a:ext>
             </a:extLst>
           </p:cNvPr>
@@ -8318,7 +8245,7 @@
           <p:cNvPr id="4" name="Content Placeholder 3">
             <a:extLst>
               <a:ext uri="{FF2B5EF4-FFF2-40B4-BE49-F238E27FC236}">
-                <a16:creationId xmlns="" xmlns:a16="http://schemas.microsoft.com/office/drawing/2014/main" id="{6BFCAA9E-8A0D-4756-B208-F45FC9974D2F}"/>
+                <a16:creationId xmlns:a16="http://schemas.microsoft.com/office/drawing/2014/main" id="{6BFCAA9E-8A0D-4756-B208-F45FC9974D2F}"/>
               </a:ext>
             </a:extLst>
           </p:cNvPr>
@@ -8350,7 +8277,7 @@
           <p:cNvPr id="5" name="TextBox 4">
             <a:extLst>
               <a:ext uri="{FF2B5EF4-FFF2-40B4-BE49-F238E27FC236}">
-                <a16:creationId xmlns="" xmlns:a16="http://schemas.microsoft.com/office/drawing/2014/main" id="{36F7D2E2-470E-41D1-BA97-76C0BA03DDF7}"/>
+                <a16:creationId xmlns:a16="http://schemas.microsoft.com/office/drawing/2014/main" id="{36F7D2E2-470E-41D1-BA97-76C0BA03DDF7}"/>
               </a:ext>
             </a:extLst>
           </p:cNvPr>
@@ -8411,7 +8338,7 @@
           <p:cNvPr id="6" name="TextBox 5">
             <a:extLst>
               <a:ext uri="{FF2B5EF4-FFF2-40B4-BE49-F238E27FC236}">
-                <a16:creationId xmlns="" xmlns:a16="http://schemas.microsoft.com/office/drawing/2014/main" id="{766545FC-D4DE-4578-96E6-87A47314220B}"/>
+                <a16:creationId xmlns:a16="http://schemas.microsoft.com/office/drawing/2014/main" id="{766545FC-D4DE-4578-96E6-87A47314220B}"/>
               </a:ext>
             </a:extLst>
           </p:cNvPr>
@@ -8454,7 +8381,7 @@
           <p:cNvPr id="7" name="TextBox 6">
             <a:extLst>
               <a:ext uri="{FF2B5EF4-FFF2-40B4-BE49-F238E27FC236}">
-                <a16:creationId xmlns="" xmlns:a16="http://schemas.microsoft.com/office/drawing/2014/main" id="{1DE4ACB1-692E-418D-B5CD-B8666F49138D}"/>
+                <a16:creationId xmlns:a16="http://schemas.microsoft.com/office/drawing/2014/main" id="{1DE4ACB1-692E-418D-B5CD-B8666F49138D}"/>
               </a:ext>
             </a:extLst>
           </p:cNvPr>
@@ -8520,13 +8447,6 @@
   <p:clrMapOvr>
     <a:masterClrMapping/>
   </p:clrMapOvr>
-  <p:timing>
-    <p:tnLst>
-      <p:par>
-        <p:cTn id="1" dur="indefinite" restart="never" nodeType="tmRoot"/>
-      </p:par>
-    </p:tnLst>
-  </p:timing>
 </p:sld>
 </file>
 
@@ -8552,7 +8472,7 @@
           <p:cNvPr id="2" name="Title 1">
             <a:extLst>
               <a:ext uri="{FF2B5EF4-FFF2-40B4-BE49-F238E27FC236}">
-                <a16:creationId xmlns="" xmlns:a16="http://schemas.microsoft.com/office/drawing/2014/main" id="{8EA3BD79-53B3-4C5B-8E6C-8302C242D467}"/>
+                <a16:creationId xmlns:a16="http://schemas.microsoft.com/office/drawing/2014/main" id="{8EA3BD79-53B3-4C5B-8E6C-8302C242D467}"/>
               </a:ext>
             </a:extLst>
           </p:cNvPr>
@@ -8588,7 +8508,7 @@
           <p:cNvPr id="3" name="Content Placeholder 2">
             <a:extLst>
               <a:ext uri="{FF2B5EF4-FFF2-40B4-BE49-F238E27FC236}">
-                <a16:creationId xmlns="" xmlns:a16="http://schemas.microsoft.com/office/drawing/2014/main" id="{DD6220EF-BEBD-4D3E-A2ED-205D60B35051}"/>
+                <a16:creationId xmlns:a16="http://schemas.microsoft.com/office/drawing/2014/main" id="{DD6220EF-BEBD-4D3E-A2ED-205D60B35051}"/>
               </a:ext>
             </a:extLst>
           </p:cNvPr>
@@ -8633,13 +8553,6 @@
   <p:clrMapOvr>
     <a:masterClrMapping/>
   </p:clrMapOvr>
-  <p:timing>
-    <p:tnLst>
-      <p:par>
-        <p:cTn id="1" dur="indefinite" restart="never" nodeType="tmRoot"/>
-      </p:par>
-    </p:tnLst>
-  </p:timing>
 </p:sld>
 </file>
 

</xml_diff>